<commit_message>
added notification for messages + power point update
</commit_message>
<xml_diff>
--- a/documentation/Baddy_presentation.pptx
+++ b/documentation/Baddy_presentation.pptx
@@ -7,12 +7,20 @@
   <p:sldIdLst>
     <p:sldId id="256" r:id="rId2"/>
     <p:sldId id="257" r:id="rId3"/>
-    <p:sldId id="258" r:id="rId4"/>
-    <p:sldId id="259" r:id="rId5"/>
-    <p:sldId id="260" r:id="rId6"/>
-    <p:sldId id="261" r:id="rId7"/>
-    <p:sldId id="262" r:id="rId8"/>
-    <p:sldId id="263" r:id="rId9"/>
+    <p:sldId id="259" r:id="rId4"/>
+    <p:sldId id="260" r:id="rId5"/>
+    <p:sldId id="261" r:id="rId6"/>
+    <p:sldId id="267" r:id="rId7"/>
+    <p:sldId id="258" r:id="rId8"/>
+    <p:sldId id="264" r:id="rId9"/>
+    <p:sldId id="265" r:id="rId10"/>
+    <p:sldId id="269" r:id="rId11"/>
+    <p:sldId id="270" r:id="rId12"/>
+    <p:sldId id="266" r:id="rId13"/>
+    <p:sldId id="268" r:id="rId14"/>
+    <p:sldId id="262" r:id="rId15"/>
+    <p:sldId id="271" r:id="rId16"/>
+    <p:sldId id="263" r:id="rId17"/>
   </p:sldIdLst>
   <p:sldSz cx="12192000" cy="6858000"/>
   <p:notesSz cx="6858000" cy="9144000"/>
@@ -111,6 +119,11 @@
       </a:defRPr>
     </a:lvl9pPr>
   </p:defaultTextStyle>
+  <p:extLst>
+    <p:ext uri="{EFAFB233-063F-42B5-8137-9DF3F51BA10A}">
+      <p15:sldGuideLst xmlns:p15="http://schemas.microsoft.com/office/powerpoint/2012/main"/>
+    </p:ext>
+  </p:extLst>
 </p:presentation>
 </file>
 
@@ -450,7 +463,7 @@
             <a:fld id="{5923F103-BC34-4FE4-A40E-EDDEECFDA5D0}" type="datetimeFigureOut">
               <a:rPr lang="en-US" dirty="0"/>
               <a:pPr/>
-              <a:t>1/24/2021</a:t>
+              <a:t>1/28/2021</a:t>
             </a:fld>
             <a:endParaRPr lang="en-US" dirty="0"/>
           </a:p>
@@ -1534,7 +1547,7 @@
           <a:p>
             <a:fld id="{923A1CC3-2375-41D4-9E03-427CAF2A4C1A}" type="datetimeFigureOut">
               <a:rPr lang="en-US" dirty="0"/>
-              <a:t>1/24/2021</a:t>
+              <a:t>1/28/2021</a:t>
             </a:fld>
             <a:endParaRPr lang="en-US" dirty="0"/>
           </a:p>
@@ -2510,7 +2523,7 @@
           <a:p>
             <a:fld id="{AFF16868-8199-4C2C-A5B1-63AEE139F88E}" type="datetimeFigureOut">
               <a:rPr lang="en-US" dirty="0"/>
-              <a:t>1/24/2021</a:t>
+              <a:t>1/28/2021</a:t>
             </a:fld>
             <a:endParaRPr lang="en-US" dirty="0"/>
           </a:p>
@@ -3640,7 +3653,7 @@
           <a:p>
             <a:fld id="{AAD9FF7F-6988-44CC-821B-644E70CD2F73}" type="datetimeFigureOut">
               <a:rPr lang="en-US" dirty="0"/>
-              <a:t>1/24/2021</a:t>
+              <a:t>1/28/2021</a:t>
             </a:fld>
             <a:endParaRPr lang="en-US" dirty="0"/>
           </a:p>
@@ -4669,7 +4682,7 @@
           <a:p>
             <a:fld id="{5C12C299-16B2-4475-990D-751901EACC14}" type="datetimeFigureOut">
               <a:rPr lang="en-US" dirty="0"/>
-              <a:t>1/24/2021</a:t>
+              <a:t>1/28/2021</a:t>
             </a:fld>
             <a:endParaRPr lang="en-US" dirty="0"/>
           </a:p>
@@ -5325,7 +5338,7 @@
           <a:p>
             <a:fld id="{9FE86839-B9D8-4651-8783-F325ECE74E65}" type="datetimeFigureOut">
               <a:rPr lang="en-US" dirty="0"/>
-              <a:t>1/24/2021</a:t>
+              <a:t>1/28/2021</a:t>
             </a:fld>
             <a:endParaRPr lang="en-US" dirty="0"/>
           </a:p>
@@ -6182,7 +6195,7 @@
           <a:p>
             <a:fld id="{FD484F64-32F6-45C5-931F-ADC1662401D0}" type="datetimeFigureOut">
               <a:rPr lang="en-US" dirty="0"/>
-              <a:t>1/24/2021</a:t>
+              <a:t>1/28/2021</a:t>
             </a:fld>
             <a:endParaRPr lang="en-US" dirty="0"/>
           </a:p>
@@ -6368,7 +6381,7 @@
           <a:p>
             <a:fld id="{53086D93-FCAC-47E0-A2EE-787E62CA814C}" type="datetimeFigureOut">
               <a:rPr lang="en-US" dirty="0"/>
-              <a:t>1/24/2021</a:t>
+              <a:t>1/28/2021</a:t>
             </a:fld>
             <a:endParaRPr lang="en-US" dirty="0"/>
           </a:p>
@@ -7336,7 +7349,7 @@
           <a:p>
             <a:fld id="{CDA879A6-0FD0-4734-A311-86BFCA472E6E}" type="datetimeFigureOut">
               <a:rPr lang="en-US" dirty="0"/>
-              <a:t>1/24/2021</a:t>
+              <a:t>1/28/2021</a:t>
             </a:fld>
             <a:endParaRPr lang="en-US" dirty="0"/>
           </a:p>
@@ -7543,7 +7556,7 @@
           <a:p>
             <a:fld id="{19C9CA7B-DFD4-44B5-8C60-D14B8CD1FB59}" type="datetimeFigureOut">
               <a:rPr lang="en-US" dirty="0"/>
-              <a:t>1/24/2021</a:t>
+              <a:t>1/28/2021</a:t>
             </a:fld>
             <a:endParaRPr lang="en-US" dirty="0"/>
           </a:p>
@@ -8573,7 +8586,7 @@
           <a:p>
             <a:fld id="{F34E6425-0181-43F2-84FC-787E803FD2F8}" type="datetimeFigureOut">
               <a:rPr lang="en-US" dirty="0"/>
-              <a:t>1/24/2021</a:t>
+              <a:t>1/28/2021</a:t>
             </a:fld>
             <a:endParaRPr lang="en-US" dirty="0"/>
           </a:p>
@@ -8841,7 +8854,7 @@
           <a:p>
             <a:fld id="{3BDB8791-F1B0-41E7-B7FD-A781E65C4266}" type="datetimeFigureOut">
               <a:rPr lang="en-US" dirty="0"/>
-              <a:t>1/24/2021</a:t>
+              <a:t>1/28/2021</a:t>
             </a:fld>
             <a:endParaRPr lang="en-US" dirty="0"/>
           </a:p>
@@ -9247,7 +9260,7 @@
           <a:p>
             <a:fld id="{5FDD63B2-E120-4ED8-B27B-C685F510A5FE}" type="datetimeFigureOut">
               <a:rPr lang="en-US" dirty="0"/>
-              <a:t>1/24/2021</a:t>
+              <a:t>1/28/2021</a:t>
             </a:fld>
             <a:endParaRPr lang="en-US" dirty="0"/>
           </a:p>
@@ -9370,7 +9383,7 @@
           <a:p>
             <a:fld id="{7AA18ACC-A947-437B-A130-35BD54FDF1E9}" type="datetimeFigureOut">
               <a:rPr lang="en-US" dirty="0"/>
-              <a:t>1/24/2021</a:t>
+              <a:t>1/28/2021</a:t>
             </a:fld>
             <a:endParaRPr lang="en-US" dirty="0"/>
           </a:p>
@@ -9461,7 +9474,7 @@
           <a:p>
             <a:fld id="{7C8D7E02-BCB8-4D50-A234-369438C08659}" type="datetimeFigureOut">
               <a:rPr lang="en-US" dirty="0"/>
-              <a:t>1/24/2021</a:t>
+              <a:t>1/28/2021</a:t>
             </a:fld>
             <a:endParaRPr lang="en-US" dirty="0"/>
           </a:p>
@@ -10538,7 +10551,7 @@
           <a:p>
             <a:fld id="{76E86A4C-8E40-4F87-A4F0-01A0687C5742}" type="datetimeFigureOut">
               <a:rPr lang="en-US" dirty="0"/>
-              <a:t>1/24/2021</a:t>
+              <a:t>1/28/2021</a:t>
             </a:fld>
             <a:endParaRPr lang="en-US" dirty="0"/>
           </a:p>
@@ -11642,7 +11655,7 @@
           <a:p>
             <a:fld id="{35E72C73-2D91-4E12-BA25-F0AA0C03599B}" type="datetimeFigureOut">
               <a:rPr lang="en-US" dirty="0"/>
-              <a:t>1/24/2021</a:t>
+              <a:t>1/28/2021</a:t>
             </a:fld>
             <a:endParaRPr lang="en-US" dirty="0"/>
           </a:p>
@@ -12635,7 +12648,7 @@
           <a:p>
             <a:fld id="{2BE451C3-0FF4-47C4-B829-773ADF60F88C}" type="datetimeFigureOut">
               <a:rPr lang="en-US" dirty="0"/>
-              <a:t>1/24/2021</a:t>
+              <a:t>1/28/2021</a:t>
             </a:fld>
             <a:endParaRPr lang="en-US" dirty="0"/>
           </a:p>
@@ -13320,6 +13333,951 @@
 </p:sld>
 </file>
 
+<file path=ppt/slides/slide10.xml><?xml version="1.0" encoding="utf-8"?>
+<p:sld xmlns:a="http://schemas.openxmlformats.org/drawingml/2006/main" xmlns:r="http://schemas.openxmlformats.org/officeDocument/2006/relationships" xmlns:p="http://schemas.openxmlformats.org/presentationml/2006/main">
+  <p:cSld>
+    <p:spTree>
+      <p:nvGrpSpPr>
+        <p:cNvPr id="1" name=""/>
+        <p:cNvGrpSpPr/>
+        <p:nvPr/>
+      </p:nvGrpSpPr>
+      <p:grpSpPr>
+        <a:xfrm>
+          <a:off x="0" y="0"/>
+          <a:ext cx="0" cy="0"/>
+          <a:chOff x="0" y="0"/>
+          <a:chExt cx="0" cy="0"/>
+        </a:xfrm>
+      </p:grpSpPr>
+      <p:sp>
+        <p:nvSpPr>
+          <p:cNvPr id="2" name="Title 1">
+            <a:extLst>
+              <a:ext uri="{FF2B5EF4-FFF2-40B4-BE49-F238E27FC236}">
+                <a16:creationId xmlns:a16="http://schemas.microsoft.com/office/drawing/2014/main" id="{A7448847-A966-469F-AF1E-11ACE7C99CD6}"/>
+              </a:ext>
+            </a:extLst>
+          </p:cNvPr>
+          <p:cNvSpPr>
+            <a:spLocks noGrp="1"/>
+          </p:cNvSpPr>
+          <p:nvPr>
+            <p:ph type="title"/>
+          </p:nvPr>
+        </p:nvSpPr>
+        <p:spPr/>
+        <p:txBody>
+          <a:bodyPr/>
+          <a:lstStyle/>
+          <a:p>
+            <a:r>
+              <a:rPr lang="it-IT" dirty="0" err="1"/>
+              <a:t>Why</a:t>
+            </a:r>
+            <a:r>
+              <a:rPr lang="it-IT" dirty="0"/>
+              <a:t> Node.js?</a:t>
+            </a:r>
+          </a:p>
+        </p:txBody>
+      </p:sp>
+      <p:sp>
+        <p:nvSpPr>
+          <p:cNvPr id="4" name="Content Placeholder 3">
+            <a:extLst>
+              <a:ext uri="{FF2B5EF4-FFF2-40B4-BE49-F238E27FC236}">
+                <a16:creationId xmlns:a16="http://schemas.microsoft.com/office/drawing/2014/main" id="{14DB01F9-E386-466A-AF4F-98ADAE76B4C9}"/>
+              </a:ext>
+            </a:extLst>
+          </p:cNvPr>
+          <p:cNvSpPr>
+            <a:spLocks noGrp="1"/>
+          </p:cNvSpPr>
+          <p:nvPr>
+            <p:ph idx="1"/>
+          </p:nvPr>
+        </p:nvSpPr>
+        <p:spPr/>
+        <p:txBody>
+          <a:bodyPr/>
+          <a:lstStyle/>
+          <a:p>
+            <a:r>
+              <a:rPr lang="it-IT" dirty="0" err="1"/>
+              <a:t>Because</a:t>
+            </a:r>
+            <a:r>
+              <a:rPr lang="it-IT" dirty="0"/>
+              <a:t> </a:t>
+            </a:r>
+            <a:r>
+              <a:rPr lang="it-IT" dirty="0" err="1"/>
+              <a:t>it’s</a:t>
+            </a:r>
+            <a:r>
+              <a:rPr lang="it-IT" dirty="0"/>
+              <a:t> cool</a:t>
+            </a:r>
+          </a:p>
+        </p:txBody>
+      </p:sp>
+      <p:pic>
+        <p:nvPicPr>
+          <p:cNvPr id="5" name="Picture 4" descr="Node.js - Wikipedia">
+            <a:extLst>
+              <a:ext uri="{FF2B5EF4-FFF2-40B4-BE49-F238E27FC236}">
+                <a16:creationId xmlns:a16="http://schemas.microsoft.com/office/drawing/2014/main" id="{A4C5869F-4649-42E2-B10D-EAF43EDC8891}"/>
+              </a:ext>
+            </a:extLst>
+          </p:cNvPr>
+          <p:cNvPicPr>
+            <a:picLocks noChangeAspect="1" noChangeArrowheads="1"/>
+          </p:cNvPicPr>
+          <p:nvPr/>
+        </p:nvPicPr>
+        <p:blipFill>
+          <a:blip r:embed="rId2">
+            <a:extLst>
+              <a:ext uri="{28A0092B-C50C-407E-A947-70E740481C1C}">
+                <a14:useLocalDpi xmlns:a14="http://schemas.microsoft.com/office/drawing/2010/main" val="0"/>
+              </a:ext>
+            </a:extLst>
+          </a:blip>
+          <a:srcRect/>
+          <a:stretch>
+            <a:fillRect/>
+          </a:stretch>
+        </p:blipFill>
+        <p:spPr bwMode="auto">
+          <a:xfrm>
+            <a:off x="8628230" y="2332523"/>
+            <a:ext cx="3066517" cy="1875600"/>
+          </a:xfrm>
+          <a:prstGeom prst="rect">
+            <a:avLst/>
+          </a:prstGeom>
+          <a:noFill/>
+          <a:extLst>
+            <a:ext uri="{909E8E84-426E-40DD-AFC4-6F175D3DCCD1}">
+              <a14:hiddenFill xmlns:a14="http://schemas.microsoft.com/office/drawing/2010/main">
+                <a:solidFill>
+                  <a:srgbClr val="FFFFFF"/>
+                </a:solidFill>
+              </a14:hiddenFill>
+            </a:ext>
+          </a:extLst>
+        </p:spPr>
+      </p:pic>
+    </p:spTree>
+    <p:extLst>
+      <p:ext uri="{BB962C8B-B14F-4D97-AF65-F5344CB8AC3E}">
+        <p14:creationId xmlns:p14="http://schemas.microsoft.com/office/powerpoint/2010/main" val="2401144580"/>
+      </p:ext>
+    </p:extLst>
+  </p:cSld>
+  <p:clrMapOvr>
+    <a:masterClrMapping/>
+  </p:clrMapOvr>
+</p:sld>
+</file>
+
+<file path=ppt/slides/slide11.xml><?xml version="1.0" encoding="utf-8"?>
+<p:sld xmlns:a="http://schemas.openxmlformats.org/drawingml/2006/main" xmlns:r="http://schemas.openxmlformats.org/officeDocument/2006/relationships" xmlns:p="http://schemas.openxmlformats.org/presentationml/2006/main">
+  <p:cSld>
+    <p:spTree>
+      <p:nvGrpSpPr>
+        <p:cNvPr id="1" name=""/>
+        <p:cNvGrpSpPr/>
+        <p:nvPr/>
+      </p:nvGrpSpPr>
+      <p:grpSpPr>
+        <a:xfrm>
+          <a:off x="0" y="0"/>
+          <a:ext cx="0" cy="0"/>
+          <a:chOff x="0" y="0"/>
+          <a:chExt cx="0" cy="0"/>
+        </a:xfrm>
+      </p:grpSpPr>
+      <p:sp>
+        <p:nvSpPr>
+          <p:cNvPr id="2" name="Title 1">
+            <a:extLst>
+              <a:ext uri="{FF2B5EF4-FFF2-40B4-BE49-F238E27FC236}">
+                <a16:creationId xmlns:a16="http://schemas.microsoft.com/office/drawing/2014/main" id="{A7448847-A966-469F-AF1E-11ACE7C99CD6}"/>
+              </a:ext>
+            </a:extLst>
+          </p:cNvPr>
+          <p:cNvSpPr>
+            <a:spLocks noGrp="1"/>
+          </p:cNvSpPr>
+          <p:nvPr>
+            <p:ph type="title"/>
+          </p:nvPr>
+        </p:nvSpPr>
+        <p:spPr/>
+        <p:txBody>
+          <a:bodyPr/>
+          <a:lstStyle/>
+          <a:p>
+            <a:r>
+              <a:rPr lang="it-IT" dirty="0"/>
+              <a:t>Styles and patterns</a:t>
+            </a:r>
+          </a:p>
+        </p:txBody>
+      </p:sp>
+      <p:sp>
+        <p:nvSpPr>
+          <p:cNvPr id="4" name="Content Placeholder 3">
+            <a:extLst>
+              <a:ext uri="{FF2B5EF4-FFF2-40B4-BE49-F238E27FC236}">
+                <a16:creationId xmlns:a16="http://schemas.microsoft.com/office/drawing/2014/main" id="{14DB01F9-E386-466A-AF4F-98ADAE76B4C9}"/>
+              </a:ext>
+            </a:extLst>
+          </p:cNvPr>
+          <p:cNvSpPr>
+            <a:spLocks noGrp="1"/>
+          </p:cNvSpPr>
+          <p:nvPr>
+            <p:ph idx="1"/>
+          </p:nvPr>
+        </p:nvSpPr>
+        <p:spPr/>
+        <p:txBody>
+          <a:bodyPr/>
+          <a:lstStyle/>
+          <a:p>
+            <a:r>
+              <a:rPr lang="it-IT" dirty="0" err="1"/>
+              <a:t>Because</a:t>
+            </a:r>
+            <a:r>
+              <a:rPr lang="it-IT" dirty="0"/>
+              <a:t> </a:t>
+            </a:r>
+            <a:r>
+              <a:rPr lang="it-IT" dirty="0" err="1"/>
+              <a:t>it’s</a:t>
+            </a:r>
+            <a:r>
+              <a:rPr lang="it-IT" dirty="0"/>
+              <a:t> cool</a:t>
+            </a:r>
+          </a:p>
+        </p:txBody>
+      </p:sp>
+    </p:spTree>
+    <p:extLst>
+      <p:ext uri="{BB962C8B-B14F-4D97-AF65-F5344CB8AC3E}">
+        <p14:creationId xmlns:p14="http://schemas.microsoft.com/office/powerpoint/2010/main" val="1029403727"/>
+      </p:ext>
+    </p:extLst>
+  </p:cSld>
+  <p:clrMapOvr>
+    <a:masterClrMapping/>
+  </p:clrMapOvr>
+</p:sld>
+</file>
+
+<file path=ppt/slides/slide12.xml><?xml version="1.0" encoding="utf-8"?>
+<p:sld xmlns:a="http://schemas.openxmlformats.org/drawingml/2006/main" xmlns:r="http://schemas.openxmlformats.org/officeDocument/2006/relationships" xmlns:p="http://schemas.openxmlformats.org/presentationml/2006/main">
+  <p:cSld>
+    <p:spTree>
+      <p:nvGrpSpPr>
+        <p:cNvPr id="1" name=""/>
+        <p:cNvGrpSpPr/>
+        <p:nvPr/>
+      </p:nvGrpSpPr>
+      <p:grpSpPr>
+        <a:xfrm>
+          <a:off x="0" y="0"/>
+          <a:ext cx="0" cy="0"/>
+          <a:chOff x="0" y="0"/>
+          <a:chExt cx="0" cy="0"/>
+        </a:xfrm>
+      </p:grpSpPr>
+      <p:sp>
+        <p:nvSpPr>
+          <p:cNvPr id="2" name="Title 1">
+            <a:extLst>
+              <a:ext uri="{FF2B5EF4-FFF2-40B4-BE49-F238E27FC236}">
+                <a16:creationId xmlns:a16="http://schemas.microsoft.com/office/drawing/2014/main" id="{B17E8E7F-4ACF-4217-8E35-84D63A5207BF}"/>
+              </a:ext>
+            </a:extLst>
+          </p:cNvPr>
+          <p:cNvSpPr>
+            <a:spLocks noGrp="1"/>
+          </p:cNvSpPr>
+          <p:nvPr>
+            <p:ph type="title"/>
+          </p:nvPr>
+        </p:nvSpPr>
+        <p:spPr/>
+        <p:txBody>
+          <a:bodyPr/>
+          <a:lstStyle/>
+          <a:p>
+            <a:r>
+              <a:rPr lang="it-IT" dirty="0"/>
+              <a:t>State management with Provider</a:t>
+            </a:r>
+          </a:p>
+        </p:txBody>
+      </p:sp>
+      <p:sp>
+        <p:nvSpPr>
+          <p:cNvPr id="3" name="Content Placeholder 2">
+            <a:extLst>
+              <a:ext uri="{FF2B5EF4-FFF2-40B4-BE49-F238E27FC236}">
+                <a16:creationId xmlns:a16="http://schemas.microsoft.com/office/drawing/2014/main" id="{97242647-C093-4A20-81BE-A966AD6A42B0}"/>
+              </a:ext>
+            </a:extLst>
+          </p:cNvPr>
+          <p:cNvSpPr>
+            <a:spLocks noGrp="1"/>
+          </p:cNvSpPr>
+          <p:nvPr>
+            <p:ph idx="1"/>
+          </p:nvPr>
+        </p:nvSpPr>
+        <p:spPr/>
+        <p:txBody>
+          <a:bodyPr/>
+          <a:lstStyle/>
+          <a:p>
+            <a:pPr marL="457200" lvl="1" indent="0">
+              <a:buNone/>
+            </a:pPr>
+            <a:endParaRPr lang="it-IT" dirty="0"/>
+          </a:p>
+        </p:txBody>
+      </p:sp>
+    </p:spTree>
+    <p:extLst>
+      <p:ext uri="{BB962C8B-B14F-4D97-AF65-F5344CB8AC3E}">
+        <p14:creationId xmlns:p14="http://schemas.microsoft.com/office/powerpoint/2010/main" val="686304578"/>
+      </p:ext>
+    </p:extLst>
+  </p:cSld>
+  <p:clrMapOvr>
+    <a:masterClrMapping/>
+  </p:clrMapOvr>
+</p:sld>
+</file>
+
+<file path=ppt/slides/slide13.xml><?xml version="1.0" encoding="utf-8"?>
+<p:sld xmlns:a="http://schemas.openxmlformats.org/drawingml/2006/main" xmlns:r="http://schemas.openxmlformats.org/officeDocument/2006/relationships" xmlns:p="http://schemas.openxmlformats.org/presentationml/2006/main">
+  <p:cSld>
+    <p:spTree>
+      <p:nvGrpSpPr>
+        <p:cNvPr id="1" name=""/>
+        <p:cNvGrpSpPr/>
+        <p:nvPr/>
+      </p:nvGrpSpPr>
+      <p:grpSpPr>
+        <a:xfrm>
+          <a:off x="0" y="0"/>
+          <a:ext cx="0" cy="0"/>
+          <a:chOff x="0" y="0"/>
+          <a:chExt cx="0" cy="0"/>
+        </a:xfrm>
+      </p:grpSpPr>
+      <p:sp>
+        <p:nvSpPr>
+          <p:cNvPr id="2" name="Title 1">
+            <a:extLst>
+              <a:ext uri="{FF2B5EF4-FFF2-40B4-BE49-F238E27FC236}">
+                <a16:creationId xmlns:a16="http://schemas.microsoft.com/office/drawing/2014/main" id="{5EC46B65-1AEE-4BB2-AC7B-8C134382E3D1}"/>
+              </a:ext>
+            </a:extLst>
+          </p:cNvPr>
+          <p:cNvSpPr>
+            <a:spLocks noGrp="1"/>
+          </p:cNvSpPr>
+          <p:nvPr>
+            <p:ph type="ctrTitle"/>
+          </p:nvPr>
+        </p:nvSpPr>
+        <p:spPr>
+          <a:xfrm>
+            <a:off x="1154955" y="1344724"/>
+            <a:ext cx="8825658" cy="2677648"/>
+          </a:xfrm>
+        </p:spPr>
+        <p:txBody>
+          <a:bodyPr/>
+          <a:lstStyle/>
+          <a:p>
+            <a:r>
+              <a:rPr lang="it-IT" dirty="0" err="1"/>
+              <a:t>Implementation</a:t>
+            </a:r>
+            <a:r>
+              <a:rPr lang="it-IT" dirty="0"/>
+              <a:t> and Testing</a:t>
+            </a:r>
+          </a:p>
+        </p:txBody>
+      </p:sp>
+    </p:spTree>
+    <p:extLst>
+      <p:ext uri="{BB962C8B-B14F-4D97-AF65-F5344CB8AC3E}">
+        <p14:creationId xmlns:p14="http://schemas.microsoft.com/office/powerpoint/2010/main" val="2526915299"/>
+      </p:ext>
+    </p:extLst>
+  </p:cSld>
+  <p:clrMapOvr>
+    <a:masterClrMapping/>
+  </p:clrMapOvr>
+</p:sld>
+</file>
+
+<file path=ppt/slides/slide14.xml><?xml version="1.0" encoding="utf-8"?>
+<p:sld xmlns:a="http://schemas.openxmlformats.org/drawingml/2006/main" xmlns:r="http://schemas.openxmlformats.org/officeDocument/2006/relationships" xmlns:p="http://schemas.openxmlformats.org/presentationml/2006/main">
+  <p:cSld>
+    <p:spTree>
+      <p:nvGrpSpPr>
+        <p:cNvPr id="1" name=""/>
+        <p:cNvGrpSpPr/>
+        <p:nvPr/>
+      </p:nvGrpSpPr>
+      <p:grpSpPr>
+        <a:xfrm>
+          <a:off x="0" y="0"/>
+          <a:ext cx="0" cy="0"/>
+          <a:chOff x="0" y="0"/>
+          <a:chExt cx="0" cy="0"/>
+        </a:xfrm>
+      </p:grpSpPr>
+      <p:sp>
+        <p:nvSpPr>
+          <p:cNvPr id="2" name="Title 1">
+            <a:extLst>
+              <a:ext uri="{FF2B5EF4-FFF2-40B4-BE49-F238E27FC236}">
+                <a16:creationId xmlns:a16="http://schemas.microsoft.com/office/drawing/2014/main" id="{B17E8E7F-4ACF-4217-8E35-84D63A5207BF}"/>
+              </a:ext>
+            </a:extLst>
+          </p:cNvPr>
+          <p:cNvSpPr>
+            <a:spLocks noGrp="1"/>
+          </p:cNvSpPr>
+          <p:nvPr>
+            <p:ph type="title"/>
+          </p:nvPr>
+        </p:nvSpPr>
+        <p:spPr/>
+        <p:txBody>
+          <a:bodyPr/>
+          <a:lstStyle/>
+          <a:p>
+            <a:r>
+              <a:rPr lang="it-IT" dirty="0"/>
+              <a:t>Development </a:t>
+            </a:r>
+            <a:r>
+              <a:rPr lang="it-IT" dirty="0" err="1"/>
+              <a:t>approach</a:t>
+            </a:r>
+            <a:endParaRPr lang="it-IT" dirty="0"/>
+          </a:p>
+        </p:txBody>
+      </p:sp>
+      <p:sp>
+        <p:nvSpPr>
+          <p:cNvPr id="3" name="Content Placeholder 2">
+            <a:extLst>
+              <a:ext uri="{FF2B5EF4-FFF2-40B4-BE49-F238E27FC236}">
+                <a16:creationId xmlns:a16="http://schemas.microsoft.com/office/drawing/2014/main" id="{97242647-C093-4A20-81BE-A966AD6A42B0}"/>
+              </a:ext>
+            </a:extLst>
+          </p:cNvPr>
+          <p:cNvSpPr>
+            <a:spLocks noGrp="1"/>
+          </p:cNvSpPr>
+          <p:nvPr>
+            <p:ph idx="1"/>
+          </p:nvPr>
+        </p:nvSpPr>
+        <p:spPr/>
+        <p:txBody>
+          <a:bodyPr/>
+          <a:lstStyle/>
+          <a:p>
+            <a:r>
+              <a:rPr lang="it-IT" dirty="0" err="1"/>
+              <a:t>We</a:t>
+            </a:r>
+            <a:r>
+              <a:rPr lang="it-IT" dirty="0"/>
+              <a:t> </a:t>
+            </a:r>
+            <a:r>
+              <a:rPr lang="it-IT" dirty="0" err="1"/>
+              <a:t>have</a:t>
+            </a:r>
+            <a:r>
+              <a:rPr lang="it-IT" dirty="0"/>
+              <a:t> </a:t>
+            </a:r>
+            <a:r>
+              <a:rPr lang="it-IT" dirty="0" err="1"/>
+              <a:t>followed</a:t>
+            </a:r>
+            <a:r>
+              <a:rPr lang="it-IT" dirty="0"/>
+              <a:t> a </a:t>
+            </a:r>
+            <a:r>
+              <a:rPr lang="it-IT" b="1" dirty="0"/>
+              <a:t>bottom-up</a:t>
+            </a:r>
+            <a:r>
+              <a:rPr lang="it-IT" dirty="0"/>
+              <a:t> </a:t>
+            </a:r>
+            <a:r>
+              <a:rPr lang="it-IT" b="1" dirty="0" err="1"/>
+              <a:t>development</a:t>
+            </a:r>
+            <a:r>
+              <a:rPr lang="it-IT" b="1" dirty="0"/>
+              <a:t> </a:t>
+            </a:r>
+            <a:r>
+              <a:rPr lang="it-IT" b="1" dirty="0" err="1"/>
+              <a:t>approach</a:t>
+            </a:r>
+            <a:r>
+              <a:rPr lang="it-IT" b="1" dirty="0"/>
+              <a:t> </a:t>
+            </a:r>
+            <a:r>
+              <a:rPr lang="it-IT" dirty="0" err="1"/>
+              <a:t>starting</a:t>
+            </a:r>
+            <a:r>
+              <a:rPr lang="it-IT" dirty="0"/>
+              <a:t> from </a:t>
+            </a:r>
+            <a:r>
+              <a:rPr lang="it-IT" dirty="0" err="1"/>
+              <a:t>independent</a:t>
+            </a:r>
+            <a:r>
+              <a:rPr lang="it-IT" dirty="0"/>
+              <a:t> and </a:t>
+            </a:r>
+            <a:r>
+              <a:rPr lang="it-IT" dirty="0" err="1"/>
+              <a:t>atomic</a:t>
+            </a:r>
+            <a:r>
+              <a:rPr lang="it-IT" dirty="0"/>
+              <a:t> </a:t>
+            </a:r>
+            <a:r>
+              <a:rPr lang="it-IT" dirty="0" err="1"/>
+              <a:t>components</a:t>
+            </a:r>
+            <a:r>
+              <a:rPr lang="it-IT" dirty="0"/>
+              <a:t> </a:t>
+            </a:r>
+            <a:r>
+              <a:rPr lang="it-IT" dirty="0" err="1"/>
+              <a:t>which</a:t>
+            </a:r>
+            <a:r>
+              <a:rPr lang="it-IT" dirty="0"/>
+              <a:t> </a:t>
+            </a:r>
+            <a:r>
+              <a:rPr lang="it-IT" dirty="0" err="1"/>
+              <a:t>were</a:t>
+            </a:r>
+            <a:r>
+              <a:rPr lang="it-IT" dirty="0"/>
+              <a:t> </a:t>
+            </a:r>
+            <a:r>
+              <a:rPr lang="it-IT" dirty="0" err="1"/>
+              <a:t>progessively</a:t>
+            </a:r>
+            <a:r>
+              <a:rPr lang="it-IT" dirty="0"/>
+              <a:t> </a:t>
+            </a:r>
+            <a:r>
+              <a:rPr lang="it-IT" dirty="0" err="1"/>
+              <a:t>integrated</a:t>
+            </a:r>
+            <a:r>
+              <a:rPr lang="it-IT" dirty="0"/>
+              <a:t> in more </a:t>
+            </a:r>
+            <a:r>
+              <a:rPr lang="it-IT" dirty="0" err="1"/>
+              <a:t>complex</a:t>
+            </a:r>
+            <a:r>
+              <a:rPr lang="it-IT" dirty="0"/>
+              <a:t> widgets and </a:t>
+            </a:r>
+            <a:r>
+              <a:rPr lang="it-IT" dirty="0" err="1"/>
+              <a:t>components</a:t>
+            </a:r>
+            <a:endParaRPr lang="it-IT" dirty="0"/>
+          </a:p>
+        </p:txBody>
+      </p:sp>
+      <p:pic>
+        <p:nvPicPr>
+          <p:cNvPr id="1026" name="Picture 2" descr="Web Strategy: Beyond Usablity --Designing using 'Bottom Up' Techniques and  Mental Models | Jeremiah Owyang">
+            <a:extLst>
+              <a:ext uri="{FF2B5EF4-FFF2-40B4-BE49-F238E27FC236}">
+                <a16:creationId xmlns:a16="http://schemas.microsoft.com/office/drawing/2014/main" id="{9053DAE5-C8DF-4525-9075-DBC3E8CC700B}"/>
+              </a:ext>
+            </a:extLst>
+          </p:cNvPr>
+          <p:cNvPicPr>
+            <a:picLocks noChangeAspect="1" noChangeArrowheads="1"/>
+          </p:cNvPicPr>
+          <p:nvPr/>
+        </p:nvPicPr>
+        <p:blipFill>
+          <a:blip r:embed="rId2">
+            <a:extLst>
+              <a:ext uri="{28A0092B-C50C-407E-A947-70E740481C1C}">
+                <a14:useLocalDpi xmlns:a14="http://schemas.microsoft.com/office/drawing/2010/main" val="0"/>
+              </a:ext>
+            </a:extLst>
+          </a:blip>
+          <a:srcRect/>
+          <a:stretch>
+            <a:fillRect/>
+          </a:stretch>
+        </p:blipFill>
+        <p:spPr bwMode="auto">
+          <a:xfrm>
+            <a:off x="4157221" y="3656496"/>
+            <a:ext cx="3393649" cy="2845795"/>
+          </a:xfrm>
+          <a:prstGeom prst="rect">
+            <a:avLst/>
+          </a:prstGeom>
+          <a:noFill/>
+          <a:extLst>
+            <a:ext uri="{909E8E84-426E-40DD-AFC4-6F175D3DCCD1}">
+              <a14:hiddenFill xmlns:a14="http://schemas.microsoft.com/office/drawing/2010/main">
+                <a:solidFill>
+                  <a:srgbClr val="FFFFFF"/>
+                </a:solidFill>
+              </a14:hiddenFill>
+            </a:ext>
+          </a:extLst>
+        </p:spPr>
+      </p:pic>
+    </p:spTree>
+    <p:extLst>
+      <p:ext uri="{BB962C8B-B14F-4D97-AF65-F5344CB8AC3E}">
+        <p14:creationId xmlns:p14="http://schemas.microsoft.com/office/powerpoint/2010/main" val="153822285"/>
+      </p:ext>
+    </p:extLst>
+  </p:cSld>
+  <p:clrMapOvr>
+    <a:masterClrMapping/>
+  </p:clrMapOvr>
+</p:sld>
+</file>
+
+<file path=ppt/slides/slide15.xml><?xml version="1.0" encoding="utf-8"?>
+<p:sld xmlns:a="http://schemas.openxmlformats.org/drawingml/2006/main" xmlns:r="http://schemas.openxmlformats.org/officeDocument/2006/relationships" xmlns:p="http://schemas.openxmlformats.org/presentationml/2006/main">
+  <p:cSld>
+    <p:spTree>
+      <p:nvGrpSpPr>
+        <p:cNvPr id="1" name=""/>
+        <p:cNvGrpSpPr/>
+        <p:nvPr/>
+      </p:nvGrpSpPr>
+      <p:grpSpPr>
+        <a:xfrm>
+          <a:off x="0" y="0"/>
+          <a:ext cx="0" cy="0"/>
+          <a:chOff x="0" y="0"/>
+          <a:chExt cx="0" cy="0"/>
+        </a:xfrm>
+      </p:grpSpPr>
+      <p:sp>
+        <p:nvSpPr>
+          <p:cNvPr id="2" name="Title 1">
+            <a:extLst>
+              <a:ext uri="{FF2B5EF4-FFF2-40B4-BE49-F238E27FC236}">
+                <a16:creationId xmlns:a16="http://schemas.microsoft.com/office/drawing/2014/main" id="{B17E8E7F-4ACF-4217-8E35-84D63A5207BF}"/>
+              </a:ext>
+            </a:extLst>
+          </p:cNvPr>
+          <p:cNvSpPr>
+            <a:spLocks noGrp="1"/>
+          </p:cNvSpPr>
+          <p:nvPr>
+            <p:ph type="title"/>
+          </p:nvPr>
+        </p:nvSpPr>
+        <p:spPr/>
+        <p:txBody>
+          <a:bodyPr/>
+          <a:lstStyle/>
+          <a:p>
+            <a:r>
+              <a:rPr lang="it-IT" dirty="0"/>
+              <a:t>Testing </a:t>
+            </a:r>
+            <a:r>
+              <a:rPr lang="it-IT" dirty="0" err="1"/>
+              <a:t>approach</a:t>
+            </a:r>
+            <a:endParaRPr lang="it-IT" dirty="0"/>
+          </a:p>
+        </p:txBody>
+      </p:sp>
+      <p:sp>
+        <p:nvSpPr>
+          <p:cNvPr id="3" name="Content Placeholder 2">
+            <a:extLst>
+              <a:ext uri="{FF2B5EF4-FFF2-40B4-BE49-F238E27FC236}">
+                <a16:creationId xmlns:a16="http://schemas.microsoft.com/office/drawing/2014/main" id="{97242647-C093-4A20-81BE-A966AD6A42B0}"/>
+              </a:ext>
+            </a:extLst>
+          </p:cNvPr>
+          <p:cNvSpPr>
+            <a:spLocks noGrp="1"/>
+          </p:cNvSpPr>
+          <p:nvPr>
+            <p:ph idx="1"/>
+          </p:nvPr>
+        </p:nvSpPr>
+        <p:spPr/>
+        <p:txBody>
+          <a:bodyPr/>
+          <a:lstStyle/>
+          <a:p>
+            <a:r>
+              <a:rPr lang="it-IT" dirty="0"/>
+              <a:t>DEBUG: </a:t>
+            </a:r>
+            <a:r>
+              <a:rPr lang="en-US" dirty="0"/>
+              <a:t>the application was mainly tested through debugging to check that the integration between the back-end, Firebase and the application was implemented correctly.</a:t>
+            </a:r>
+          </a:p>
+          <a:p>
+            <a:r>
+              <a:rPr lang="en-US" dirty="0"/>
+              <a:t>WIDGET TESTING: </a:t>
+            </a:r>
+            <a:r>
+              <a:rPr lang="it-IT" dirty="0" err="1"/>
+              <a:t>each</a:t>
+            </a:r>
+            <a:r>
+              <a:rPr lang="it-IT" dirty="0"/>
+              <a:t> </a:t>
+            </a:r>
+            <a:r>
+              <a:rPr lang="it-IT" dirty="0" err="1"/>
+              <a:t>separable</a:t>
+            </a:r>
+            <a:r>
+              <a:rPr lang="it-IT" dirty="0"/>
+              <a:t> widget </a:t>
+            </a:r>
+            <a:r>
+              <a:rPr lang="it-IT" dirty="0" err="1"/>
+              <a:t>was</a:t>
+            </a:r>
+            <a:r>
+              <a:rPr lang="it-IT" dirty="0"/>
+              <a:t> </a:t>
+            </a:r>
+            <a:r>
+              <a:rPr lang="it-IT" dirty="0" err="1"/>
+              <a:t>tested</a:t>
+            </a:r>
+            <a:r>
+              <a:rPr lang="it-IT" dirty="0"/>
+              <a:t> following the </a:t>
+            </a:r>
+            <a:r>
+              <a:rPr lang="it-IT" dirty="0" err="1"/>
+              <a:t>approach</a:t>
+            </a:r>
+            <a:r>
+              <a:rPr lang="it-IT" dirty="0"/>
+              <a:t> of </a:t>
+            </a:r>
+            <a:r>
+              <a:rPr lang="it-IT" dirty="0" err="1"/>
+              <a:t>Futter</a:t>
+            </a:r>
+            <a:r>
+              <a:rPr lang="it-IT" dirty="0"/>
+              <a:t> Widget </a:t>
+            </a:r>
+            <a:r>
+              <a:rPr lang="it-IT" dirty="0" err="1"/>
+              <a:t>tests</a:t>
+            </a:r>
+            <a:endParaRPr lang="it-IT" dirty="0"/>
+          </a:p>
+          <a:p>
+            <a:endParaRPr lang="en-US" dirty="0"/>
+          </a:p>
+        </p:txBody>
+      </p:sp>
+      <p:pic>
+        <p:nvPicPr>
+          <p:cNvPr id="5" name="Picture 4" descr="Text&#10;&#10;Description automatically generated">
+            <a:extLst>
+              <a:ext uri="{FF2B5EF4-FFF2-40B4-BE49-F238E27FC236}">
+                <a16:creationId xmlns:a16="http://schemas.microsoft.com/office/drawing/2014/main" id="{6A3E2B86-373C-49F5-AB8C-D10C5EF514AC}"/>
+              </a:ext>
+            </a:extLst>
+          </p:cNvPr>
+          <p:cNvPicPr>
+            <a:picLocks noChangeAspect="1"/>
+          </p:cNvPicPr>
+          <p:nvPr/>
+        </p:nvPicPr>
+        <p:blipFill>
+          <a:blip r:embed="rId2"/>
+          <a:stretch>
+            <a:fillRect/>
+          </a:stretch>
+        </p:blipFill>
+        <p:spPr>
+          <a:xfrm>
+            <a:off x="5465821" y="3938411"/>
+            <a:ext cx="3681921" cy="2743770"/>
+          </a:xfrm>
+          <a:prstGeom prst="rect">
+            <a:avLst/>
+          </a:prstGeom>
+        </p:spPr>
+      </p:pic>
+    </p:spTree>
+    <p:extLst>
+      <p:ext uri="{BB962C8B-B14F-4D97-AF65-F5344CB8AC3E}">
+        <p14:creationId xmlns:p14="http://schemas.microsoft.com/office/powerpoint/2010/main" val="4010397903"/>
+      </p:ext>
+    </p:extLst>
+  </p:cSld>
+  <p:clrMapOvr>
+    <a:masterClrMapping/>
+  </p:clrMapOvr>
+</p:sld>
+</file>
+
+<file path=ppt/slides/slide16.xml><?xml version="1.0" encoding="utf-8"?>
+<p:sld xmlns:a="http://schemas.openxmlformats.org/drawingml/2006/main" xmlns:r="http://schemas.openxmlformats.org/officeDocument/2006/relationships" xmlns:p="http://schemas.openxmlformats.org/presentationml/2006/main">
+  <p:cSld>
+    <p:spTree>
+      <p:nvGrpSpPr>
+        <p:cNvPr id="1" name=""/>
+        <p:cNvGrpSpPr/>
+        <p:nvPr/>
+      </p:nvGrpSpPr>
+      <p:grpSpPr>
+        <a:xfrm>
+          <a:off x="0" y="0"/>
+          <a:ext cx="0" cy="0"/>
+          <a:chOff x="0" y="0"/>
+          <a:chExt cx="0" cy="0"/>
+        </a:xfrm>
+      </p:grpSpPr>
+      <p:sp>
+        <p:nvSpPr>
+          <p:cNvPr id="2" name="Title 1">
+            <a:extLst>
+              <a:ext uri="{FF2B5EF4-FFF2-40B4-BE49-F238E27FC236}">
+                <a16:creationId xmlns:a16="http://schemas.microsoft.com/office/drawing/2014/main" id="{5D9B0ABD-4C2C-43B5-BBAA-C48B8B591180}"/>
+              </a:ext>
+            </a:extLst>
+          </p:cNvPr>
+          <p:cNvSpPr>
+            <a:spLocks noGrp="1"/>
+          </p:cNvSpPr>
+          <p:nvPr>
+            <p:ph type="title"/>
+          </p:nvPr>
+        </p:nvSpPr>
+        <p:spPr/>
+        <p:txBody>
+          <a:bodyPr/>
+          <a:lstStyle/>
+          <a:p>
+            <a:r>
+              <a:rPr lang="it-IT" dirty="0" err="1"/>
+              <a:t>Now</a:t>
+            </a:r>
+            <a:r>
+              <a:rPr lang="it-IT" dirty="0"/>
+              <a:t>…</a:t>
+            </a:r>
+          </a:p>
+        </p:txBody>
+      </p:sp>
+      <p:sp>
+        <p:nvSpPr>
+          <p:cNvPr id="3" name="Content Placeholder 2">
+            <a:extLst>
+              <a:ext uri="{FF2B5EF4-FFF2-40B4-BE49-F238E27FC236}">
+                <a16:creationId xmlns:a16="http://schemas.microsoft.com/office/drawing/2014/main" id="{7B08C715-E153-4E79-85AB-5A4905537500}"/>
+              </a:ext>
+            </a:extLst>
+          </p:cNvPr>
+          <p:cNvSpPr>
+            <a:spLocks noGrp="1"/>
+          </p:cNvSpPr>
+          <p:nvPr>
+            <p:ph idx="1"/>
+          </p:nvPr>
+        </p:nvSpPr>
+        <p:spPr/>
+        <p:txBody>
+          <a:bodyPr>
+            <a:normAutofit/>
+          </a:bodyPr>
+          <a:lstStyle/>
+          <a:p>
+            <a:pPr marL="0" indent="0">
+              <a:buNone/>
+            </a:pPr>
+            <a:r>
+              <a:rPr lang="it-IT" sz="6000" dirty="0" err="1"/>
+              <a:t>It’s</a:t>
+            </a:r>
+            <a:r>
+              <a:rPr lang="it-IT" sz="6000" dirty="0"/>
+              <a:t> demo time</a:t>
+            </a:r>
+          </a:p>
+        </p:txBody>
+      </p:sp>
+    </p:spTree>
+    <p:extLst>
+      <p:ext uri="{BB962C8B-B14F-4D97-AF65-F5344CB8AC3E}">
+        <p14:creationId xmlns:p14="http://schemas.microsoft.com/office/powerpoint/2010/main" val="2665333462"/>
+      </p:ext>
+    </p:extLst>
+  </p:cSld>
+  <p:clrMapOvr>
+    <a:masterClrMapping/>
+  </p:clrMapOvr>
+</p:sld>
+</file>
+
 <file path=ppt/slides/slide2.xml><?xml version="1.0" encoding="utf-8"?>
 <p:sld xmlns:a="http://schemas.openxmlformats.org/drawingml/2006/main" xmlns:r="http://schemas.openxmlformats.org/officeDocument/2006/relationships" xmlns:p="http://schemas.openxmlformats.org/presentationml/2006/main">
   <p:cSld>
@@ -13496,6 +14454,753 @@
 </file>
 
 <file path=ppt/slides/slide3.xml><?xml version="1.0" encoding="utf-8"?>
+<p:sld xmlns:a="http://schemas.openxmlformats.org/drawingml/2006/main" xmlns:r="http://schemas.openxmlformats.org/officeDocument/2006/relationships" xmlns:p="http://schemas.openxmlformats.org/presentationml/2006/main">
+  <p:cSld>
+    <p:spTree>
+      <p:nvGrpSpPr>
+        <p:cNvPr id="1" name=""/>
+        <p:cNvGrpSpPr/>
+        <p:nvPr/>
+      </p:nvGrpSpPr>
+      <p:grpSpPr>
+        <a:xfrm>
+          <a:off x="0" y="0"/>
+          <a:ext cx="0" cy="0"/>
+          <a:chOff x="0" y="0"/>
+          <a:chExt cx="0" cy="0"/>
+        </a:xfrm>
+      </p:grpSpPr>
+      <p:sp>
+        <p:nvSpPr>
+          <p:cNvPr id="2" name="Title 1">
+            <a:extLst>
+              <a:ext uri="{FF2B5EF4-FFF2-40B4-BE49-F238E27FC236}">
+                <a16:creationId xmlns:a16="http://schemas.microsoft.com/office/drawing/2014/main" id="{EBB11B71-9D4A-4B5E-A6C8-3C9A9EAD78C5}"/>
+              </a:ext>
+            </a:extLst>
+          </p:cNvPr>
+          <p:cNvSpPr>
+            <a:spLocks noGrp="1"/>
+          </p:cNvSpPr>
+          <p:nvPr>
+            <p:ph type="title"/>
+          </p:nvPr>
+        </p:nvSpPr>
+        <p:spPr/>
+        <p:txBody>
+          <a:bodyPr/>
+          <a:lstStyle/>
+          <a:p>
+            <a:r>
+              <a:rPr lang="it-IT" dirty="0"/>
+              <a:t>Features</a:t>
+            </a:r>
+          </a:p>
+        </p:txBody>
+      </p:sp>
+      <p:sp>
+        <p:nvSpPr>
+          <p:cNvPr id="3" name="Content Placeholder 2">
+            <a:extLst>
+              <a:ext uri="{FF2B5EF4-FFF2-40B4-BE49-F238E27FC236}">
+                <a16:creationId xmlns:a16="http://schemas.microsoft.com/office/drawing/2014/main" id="{95DF66A6-0BB2-4AF1-8C45-611659F46837}"/>
+              </a:ext>
+            </a:extLst>
+          </p:cNvPr>
+          <p:cNvSpPr>
+            <a:spLocks noGrp="1"/>
+          </p:cNvSpPr>
+          <p:nvPr>
+            <p:ph idx="1"/>
+          </p:nvPr>
+        </p:nvSpPr>
+        <p:spPr/>
+        <p:txBody>
+          <a:bodyPr/>
+          <a:lstStyle/>
+          <a:p>
+            <a:r>
+              <a:rPr lang="it-IT" dirty="0"/>
+              <a:t>The features </a:t>
+            </a:r>
+            <a:r>
+              <a:rPr lang="it-IT" dirty="0" err="1"/>
+              <a:t>provided</a:t>
+            </a:r>
+            <a:r>
+              <a:rPr lang="it-IT" dirty="0"/>
+              <a:t> by the </a:t>
+            </a:r>
+            <a:r>
+              <a:rPr lang="it-IT" dirty="0" err="1"/>
+              <a:t>application</a:t>
+            </a:r>
+            <a:r>
+              <a:rPr lang="it-IT" dirty="0"/>
+              <a:t> are </a:t>
+            </a:r>
+            <a:r>
+              <a:rPr lang="it-IT" dirty="0" err="1"/>
+              <a:t>different</a:t>
+            </a:r>
+            <a:r>
+              <a:rPr lang="it-IT" dirty="0"/>
+              <a:t> </a:t>
+            </a:r>
+            <a:r>
+              <a:rPr lang="it-IT" dirty="0" err="1"/>
+              <a:t>according</a:t>
+            </a:r>
+            <a:r>
+              <a:rPr lang="it-IT" dirty="0"/>
+              <a:t> to the account </a:t>
+            </a:r>
+            <a:r>
+              <a:rPr lang="it-IT" dirty="0" err="1"/>
+              <a:t>type</a:t>
+            </a:r>
+            <a:r>
+              <a:rPr lang="it-IT" dirty="0"/>
+              <a:t> of the user, </a:t>
+            </a:r>
+            <a:r>
+              <a:rPr lang="it-IT" dirty="0" err="1"/>
+              <a:t>which</a:t>
+            </a:r>
+            <a:r>
+              <a:rPr lang="it-IT" dirty="0"/>
+              <a:t> can be:</a:t>
+            </a:r>
+          </a:p>
+          <a:p>
+            <a:pPr lvl="1"/>
+            <a:r>
+              <a:rPr lang="it-IT" dirty="0"/>
+              <a:t>Client</a:t>
+            </a:r>
+          </a:p>
+          <a:p>
+            <a:pPr lvl="1"/>
+            <a:r>
+              <a:rPr lang="it-IT" dirty="0" err="1"/>
+              <a:t>Caregiver</a:t>
+            </a:r>
+            <a:endParaRPr lang="it-IT" dirty="0"/>
+          </a:p>
+        </p:txBody>
+      </p:sp>
+    </p:spTree>
+    <p:extLst>
+      <p:ext uri="{BB962C8B-B14F-4D97-AF65-F5344CB8AC3E}">
+        <p14:creationId xmlns:p14="http://schemas.microsoft.com/office/powerpoint/2010/main" val="2687509695"/>
+      </p:ext>
+    </p:extLst>
+  </p:cSld>
+  <p:clrMapOvr>
+    <a:masterClrMapping/>
+  </p:clrMapOvr>
+</p:sld>
+</file>
+
+<file path=ppt/slides/slide4.xml><?xml version="1.0" encoding="utf-8"?>
+<p:sld xmlns:a="http://schemas.openxmlformats.org/drawingml/2006/main" xmlns:r="http://schemas.openxmlformats.org/officeDocument/2006/relationships" xmlns:p="http://schemas.openxmlformats.org/presentationml/2006/main">
+  <p:cSld>
+    <p:spTree>
+      <p:nvGrpSpPr>
+        <p:cNvPr id="1" name=""/>
+        <p:cNvGrpSpPr/>
+        <p:nvPr/>
+      </p:nvGrpSpPr>
+      <p:grpSpPr>
+        <a:xfrm>
+          <a:off x="0" y="0"/>
+          <a:ext cx="0" cy="0"/>
+          <a:chOff x="0" y="0"/>
+          <a:chExt cx="0" cy="0"/>
+        </a:xfrm>
+      </p:grpSpPr>
+      <p:sp>
+        <p:nvSpPr>
+          <p:cNvPr id="2" name="Title 1">
+            <a:extLst>
+              <a:ext uri="{FF2B5EF4-FFF2-40B4-BE49-F238E27FC236}">
+                <a16:creationId xmlns:a16="http://schemas.microsoft.com/office/drawing/2014/main" id="{2E35FCF9-6A7A-4E4E-B642-1B47965D96B9}"/>
+              </a:ext>
+            </a:extLst>
+          </p:cNvPr>
+          <p:cNvSpPr>
+            <a:spLocks noGrp="1"/>
+          </p:cNvSpPr>
+          <p:nvPr>
+            <p:ph type="title"/>
+          </p:nvPr>
+        </p:nvSpPr>
+        <p:spPr/>
+        <p:txBody>
+          <a:bodyPr/>
+          <a:lstStyle/>
+          <a:p>
+            <a:r>
+              <a:rPr lang="it-IT" dirty="0"/>
+              <a:t>Client Features</a:t>
+            </a:r>
+          </a:p>
+        </p:txBody>
+      </p:sp>
+      <p:sp>
+        <p:nvSpPr>
+          <p:cNvPr id="3" name="Content Placeholder 2">
+            <a:extLst>
+              <a:ext uri="{FF2B5EF4-FFF2-40B4-BE49-F238E27FC236}">
+                <a16:creationId xmlns:a16="http://schemas.microsoft.com/office/drawing/2014/main" id="{30AD45DB-B722-49BF-A65D-31889FF890D7}"/>
+              </a:ext>
+            </a:extLst>
+          </p:cNvPr>
+          <p:cNvSpPr>
+            <a:spLocks noGrp="1"/>
+          </p:cNvSpPr>
+          <p:nvPr>
+            <p:ph idx="1"/>
+          </p:nvPr>
+        </p:nvSpPr>
+        <p:spPr/>
+        <p:txBody>
+          <a:bodyPr/>
+          <a:lstStyle/>
+          <a:p>
+            <a:r>
+              <a:rPr lang="it-IT" dirty="0"/>
+              <a:t>A user </a:t>
+            </a:r>
+            <a:r>
+              <a:rPr lang="it-IT" dirty="0" err="1"/>
+              <a:t>registered</a:t>
+            </a:r>
+            <a:r>
+              <a:rPr lang="it-IT" dirty="0"/>
+              <a:t> </a:t>
+            </a:r>
+            <a:r>
+              <a:rPr lang="it-IT" dirty="0" err="1"/>
+              <a:t>as</a:t>
+            </a:r>
+            <a:r>
+              <a:rPr lang="it-IT" dirty="0"/>
+              <a:t> a customer can:</a:t>
+            </a:r>
+          </a:p>
+          <a:p>
+            <a:pPr lvl="1"/>
+            <a:r>
+              <a:rPr lang="it-IT" dirty="0"/>
+              <a:t>Scroll the list of the </a:t>
+            </a:r>
+            <a:r>
+              <a:rPr lang="it-IT" dirty="0" err="1"/>
+              <a:t>registered</a:t>
+            </a:r>
+            <a:r>
+              <a:rPr lang="it-IT" dirty="0"/>
+              <a:t> </a:t>
+            </a:r>
+            <a:r>
+              <a:rPr lang="it-IT" dirty="0" err="1"/>
+              <a:t>caregivers</a:t>
+            </a:r>
+            <a:endParaRPr lang="it-IT" dirty="0"/>
+          </a:p>
+          <a:p>
+            <a:pPr lvl="1"/>
+            <a:r>
+              <a:rPr lang="it-IT" dirty="0" err="1"/>
+              <a:t>Search</a:t>
+            </a:r>
+            <a:r>
+              <a:rPr lang="it-IT" dirty="0"/>
+              <a:t> the </a:t>
+            </a:r>
+            <a:r>
+              <a:rPr lang="it-IT" dirty="0" err="1"/>
+              <a:t>caregivers</a:t>
+            </a:r>
+            <a:r>
+              <a:rPr lang="it-IT" dirty="0"/>
+              <a:t> </a:t>
+            </a:r>
+            <a:r>
+              <a:rPr lang="it-IT" dirty="0" err="1"/>
+              <a:t>according</a:t>
+            </a:r>
+            <a:r>
+              <a:rPr lang="it-IT" dirty="0"/>
+              <a:t> to </a:t>
+            </a:r>
+            <a:r>
+              <a:rPr lang="it-IT" dirty="0" err="1"/>
+              <a:t>his</a:t>
+            </a:r>
+            <a:r>
+              <a:rPr lang="it-IT" dirty="0"/>
+              <a:t> city</a:t>
+            </a:r>
+          </a:p>
+          <a:p>
+            <a:pPr lvl="1"/>
+            <a:r>
+              <a:rPr lang="it-IT" dirty="0" err="1"/>
+              <a:t>View</a:t>
+            </a:r>
+            <a:r>
+              <a:rPr lang="it-IT" dirty="0"/>
+              <a:t> a </a:t>
+            </a:r>
+            <a:r>
+              <a:rPr lang="it-IT" dirty="0" err="1"/>
+              <a:t>specific</a:t>
+            </a:r>
+            <a:r>
+              <a:rPr lang="it-IT" dirty="0"/>
+              <a:t> </a:t>
+            </a:r>
+            <a:r>
+              <a:rPr lang="it-IT" dirty="0" err="1"/>
+              <a:t>caregiver</a:t>
+            </a:r>
+            <a:r>
+              <a:rPr lang="it-IT" dirty="0"/>
+              <a:t> </a:t>
+            </a:r>
+            <a:r>
+              <a:rPr lang="it-IT" dirty="0" err="1"/>
+              <a:t>profile</a:t>
+            </a:r>
+            <a:r>
+              <a:rPr lang="it-IT" dirty="0"/>
+              <a:t> </a:t>
+            </a:r>
+          </a:p>
+          <a:p>
+            <a:pPr lvl="1"/>
+            <a:r>
+              <a:rPr lang="it-IT" dirty="0" err="1"/>
+              <a:t>Leave</a:t>
+            </a:r>
+            <a:r>
+              <a:rPr lang="it-IT" dirty="0"/>
+              <a:t> a review on a </a:t>
+            </a:r>
+            <a:r>
+              <a:rPr lang="it-IT" dirty="0" err="1"/>
+              <a:t>caregiver</a:t>
+            </a:r>
+            <a:r>
+              <a:rPr lang="it-IT" dirty="0"/>
+              <a:t> </a:t>
+            </a:r>
+            <a:r>
+              <a:rPr lang="it-IT" dirty="0" err="1"/>
+              <a:t>profile</a:t>
+            </a:r>
+            <a:endParaRPr lang="en-US" dirty="0"/>
+          </a:p>
+          <a:p>
+            <a:pPr lvl="1"/>
+            <a:r>
+              <a:rPr lang="en-US" dirty="0"/>
+              <a:t>Let a caregiver know you are interested in his/her </a:t>
+            </a:r>
+          </a:p>
+          <a:p>
+            <a:pPr marL="457200" lvl="1" indent="0">
+              <a:buNone/>
+            </a:pPr>
+            <a:r>
+              <a:rPr lang="en-US" dirty="0"/>
+              <a:t>      profile with a message</a:t>
+            </a:r>
+          </a:p>
+        </p:txBody>
+      </p:sp>
+      <p:pic>
+        <p:nvPicPr>
+          <p:cNvPr id="7" name="Picture 6">
+            <a:extLst>
+              <a:ext uri="{FF2B5EF4-FFF2-40B4-BE49-F238E27FC236}">
+                <a16:creationId xmlns:a16="http://schemas.microsoft.com/office/drawing/2014/main" id="{2C6BDBB8-6075-4360-A1B4-E8F2F5FF05C7}"/>
+              </a:ext>
+            </a:extLst>
+          </p:cNvPr>
+          <p:cNvPicPr>
+            <a:picLocks noChangeAspect="1"/>
+          </p:cNvPicPr>
+          <p:nvPr/>
+        </p:nvPicPr>
+        <p:blipFill>
+          <a:blip r:embed="rId2"/>
+          <a:stretch>
+            <a:fillRect/>
+          </a:stretch>
+        </p:blipFill>
+        <p:spPr>
+          <a:xfrm>
+            <a:off x="7456602" y="3881093"/>
+            <a:ext cx="4295480" cy="2684675"/>
+          </a:xfrm>
+          <a:prstGeom prst="rect">
+            <a:avLst/>
+          </a:prstGeom>
+        </p:spPr>
+      </p:pic>
+    </p:spTree>
+    <p:extLst>
+      <p:ext uri="{BB962C8B-B14F-4D97-AF65-F5344CB8AC3E}">
+        <p14:creationId xmlns:p14="http://schemas.microsoft.com/office/powerpoint/2010/main" val="2548685359"/>
+      </p:ext>
+    </p:extLst>
+  </p:cSld>
+  <p:clrMapOvr>
+    <a:masterClrMapping/>
+  </p:clrMapOvr>
+</p:sld>
+</file>
+
+<file path=ppt/slides/slide5.xml><?xml version="1.0" encoding="utf-8"?>
+<p:sld xmlns:a="http://schemas.openxmlformats.org/drawingml/2006/main" xmlns:r="http://schemas.openxmlformats.org/officeDocument/2006/relationships" xmlns:p="http://schemas.openxmlformats.org/presentationml/2006/main">
+  <p:cSld>
+    <p:spTree>
+      <p:nvGrpSpPr>
+        <p:cNvPr id="1" name=""/>
+        <p:cNvGrpSpPr/>
+        <p:nvPr/>
+      </p:nvGrpSpPr>
+      <p:grpSpPr>
+        <a:xfrm>
+          <a:off x="0" y="0"/>
+          <a:ext cx="0" cy="0"/>
+          <a:chOff x="0" y="0"/>
+          <a:chExt cx="0" cy="0"/>
+        </a:xfrm>
+      </p:grpSpPr>
+      <p:sp>
+        <p:nvSpPr>
+          <p:cNvPr id="2" name="Title 1">
+            <a:extLst>
+              <a:ext uri="{FF2B5EF4-FFF2-40B4-BE49-F238E27FC236}">
+                <a16:creationId xmlns:a16="http://schemas.microsoft.com/office/drawing/2014/main" id="{2E35FCF9-6A7A-4E4E-B642-1B47965D96B9}"/>
+              </a:ext>
+            </a:extLst>
+          </p:cNvPr>
+          <p:cNvSpPr>
+            <a:spLocks noGrp="1"/>
+          </p:cNvSpPr>
+          <p:nvPr>
+            <p:ph type="title"/>
+          </p:nvPr>
+        </p:nvSpPr>
+        <p:spPr/>
+        <p:txBody>
+          <a:bodyPr/>
+          <a:lstStyle/>
+          <a:p>
+            <a:r>
+              <a:rPr lang="it-IT" dirty="0" err="1"/>
+              <a:t>Caregiver</a:t>
+            </a:r>
+            <a:r>
+              <a:rPr lang="it-IT" dirty="0"/>
+              <a:t> Features</a:t>
+            </a:r>
+          </a:p>
+        </p:txBody>
+      </p:sp>
+      <p:sp>
+        <p:nvSpPr>
+          <p:cNvPr id="3" name="Content Placeholder 2">
+            <a:extLst>
+              <a:ext uri="{FF2B5EF4-FFF2-40B4-BE49-F238E27FC236}">
+                <a16:creationId xmlns:a16="http://schemas.microsoft.com/office/drawing/2014/main" id="{30AD45DB-B722-49BF-A65D-31889FF890D7}"/>
+              </a:ext>
+            </a:extLst>
+          </p:cNvPr>
+          <p:cNvSpPr>
+            <a:spLocks noGrp="1"/>
+          </p:cNvSpPr>
+          <p:nvPr>
+            <p:ph idx="1"/>
+          </p:nvPr>
+        </p:nvSpPr>
+        <p:spPr/>
+        <p:txBody>
+          <a:bodyPr/>
+          <a:lstStyle/>
+          <a:p>
+            <a:r>
+              <a:rPr lang="it-IT" dirty="0"/>
+              <a:t>A user </a:t>
+            </a:r>
+            <a:r>
+              <a:rPr lang="it-IT" dirty="0" err="1"/>
+              <a:t>registered</a:t>
+            </a:r>
+            <a:r>
+              <a:rPr lang="it-IT" dirty="0"/>
+              <a:t> </a:t>
+            </a:r>
+            <a:r>
+              <a:rPr lang="it-IT" dirty="0" err="1"/>
+              <a:t>as</a:t>
+            </a:r>
+            <a:r>
+              <a:rPr lang="it-IT" dirty="0"/>
+              <a:t> a </a:t>
+            </a:r>
+            <a:r>
+              <a:rPr lang="it-IT" dirty="0" err="1"/>
+              <a:t>caregiver</a:t>
+            </a:r>
+            <a:r>
+              <a:rPr lang="it-IT" dirty="0"/>
+              <a:t> </a:t>
+            </a:r>
+            <a:r>
+              <a:rPr lang="it-IT" dirty="0" err="1"/>
+              <a:t>is</a:t>
+            </a:r>
+            <a:r>
+              <a:rPr lang="it-IT" dirty="0"/>
+              <a:t> a passive user </a:t>
+            </a:r>
+            <a:r>
+              <a:rPr lang="it-IT" dirty="0" err="1"/>
+              <a:t>which</a:t>
+            </a:r>
+            <a:r>
+              <a:rPr lang="it-IT" dirty="0"/>
+              <a:t> can:</a:t>
+            </a:r>
+          </a:p>
+          <a:p>
+            <a:pPr lvl="1"/>
+            <a:r>
+              <a:rPr lang="it-IT" dirty="0" err="1"/>
+              <a:t>Register</a:t>
+            </a:r>
+            <a:r>
+              <a:rPr lang="it-IT" dirty="0"/>
+              <a:t> to the system</a:t>
+            </a:r>
+          </a:p>
+          <a:p>
+            <a:pPr lvl="1"/>
+            <a:r>
+              <a:rPr lang="it-IT" dirty="0" err="1"/>
+              <a:t>View</a:t>
+            </a:r>
+            <a:r>
+              <a:rPr lang="it-IT" dirty="0"/>
+              <a:t> the reviews </a:t>
+            </a:r>
+            <a:r>
+              <a:rPr lang="it-IT" dirty="0" err="1"/>
+              <a:t>left</a:t>
+            </a:r>
+            <a:r>
+              <a:rPr lang="it-IT" dirty="0"/>
+              <a:t> by client users</a:t>
+            </a:r>
+          </a:p>
+          <a:p>
+            <a:pPr lvl="1"/>
+            <a:r>
+              <a:rPr lang="it-IT" dirty="0" err="1"/>
+              <a:t>Receive</a:t>
+            </a:r>
+            <a:r>
+              <a:rPr lang="it-IT" dirty="0"/>
+              <a:t> </a:t>
+            </a:r>
+            <a:r>
+              <a:rPr lang="it-IT" dirty="0" err="1"/>
+              <a:t>notification</a:t>
+            </a:r>
+            <a:r>
+              <a:rPr lang="it-IT" dirty="0"/>
+              <a:t> of a new review</a:t>
+            </a:r>
+          </a:p>
+          <a:p>
+            <a:pPr lvl="1"/>
+            <a:r>
+              <a:rPr lang="it-IT" dirty="0" err="1"/>
+              <a:t>Receive</a:t>
+            </a:r>
+            <a:r>
+              <a:rPr lang="it-IT" dirty="0"/>
+              <a:t> </a:t>
+            </a:r>
+            <a:r>
+              <a:rPr lang="it-IT" dirty="0" err="1"/>
+              <a:t>notification</a:t>
+            </a:r>
+            <a:r>
+              <a:rPr lang="it-IT" dirty="0"/>
+              <a:t> of a new </a:t>
+            </a:r>
+            <a:r>
+              <a:rPr lang="it-IT" dirty="0" err="1"/>
+              <a:t>message</a:t>
+            </a:r>
+            <a:endParaRPr lang="it-IT" dirty="0"/>
+          </a:p>
+          <a:p>
+            <a:pPr lvl="1"/>
+            <a:r>
+              <a:rPr lang="it-IT" dirty="0" err="1"/>
+              <a:t>View</a:t>
+            </a:r>
+            <a:r>
+              <a:rPr lang="it-IT" dirty="0"/>
+              <a:t> the people </a:t>
+            </a:r>
+            <a:r>
+              <a:rPr lang="it-IT" dirty="0" err="1"/>
+              <a:t>interested</a:t>
+            </a:r>
+            <a:r>
+              <a:rPr lang="it-IT" dirty="0"/>
+              <a:t> in </a:t>
+            </a:r>
+            <a:r>
+              <a:rPr lang="it-IT" dirty="0" err="1"/>
+              <a:t>his</a:t>
+            </a:r>
+            <a:r>
+              <a:rPr lang="it-IT" dirty="0"/>
+              <a:t>/</a:t>
+            </a:r>
+            <a:r>
+              <a:rPr lang="it-IT" dirty="0" err="1"/>
+              <a:t>her</a:t>
+            </a:r>
+            <a:r>
+              <a:rPr lang="it-IT" dirty="0"/>
+              <a:t> </a:t>
+            </a:r>
+            <a:r>
+              <a:rPr lang="it-IT" dirty="0" err="1"/>
+              <a:t>profile</a:t>
+            </a:r>
+            <a:endParaRPr lang="it-IT" dirty="0"/>
+          </a:p>
+        </p:txBody>
+      </p:sp>
+      <p:pic>
+        <p:nvPicPr>
+          <p:cNvPr id="8" name="Picture 7">
+            <a:extLst>
+              <a:ext uri="{FF2B5EF4-FFF2-40B4-BE49-F238E27FC236}">
+                <a16:creationId xmlns:a16="http://schemas.microsoft.com/office/drawing/2014/main" id="{72D18156-771B-49DC-9DFE-1D48A3DD07DF}"/>
+              </a:ext>
+            </a:extLst>
+          </p:cNvPr>
+          <p:cNvPicPr>
+            <a:picLocks noChangeAspect="1"/>
+          </p:cNvPicPr>
+          <p:nvPr/>
+        </p:nvPicPr>
+        <p:blipFill>
+          <a:blip r:embed="rId2"/>
+          <a:stretch>
+            <a:fillRect/>
+          </a:stretch>
+        </p:blipFill>
+        <p:spPr>
+          <a:xfrm>
+            <a:off x="7533314" y="3364684"/>
+            <a:ext cx="2922864" cy="2922864"/>
+          </a:xfrm>
+          <a:prstGeom prst="rect">
+            <a:avLst/>
+          </a:prstGeom>
+        </p:spPr>
+      </p:pic>
+    </p:spTree>
+    <p:extLst>
+      <p:ext uri="{BB962C8B-B14F-4D97-AF65-F5344CB8AC3E}">
+        <p14:creationId xmlns:p14="http://schemas.microsoft.com/office/powerpoint/2010/main" val="3773927568"/>
+      </p:ext>
+    </p:extLst>
+  </p:cSld>
+  <p:clrMapOvr>
+    <a:masterClrMapping/>
+  </p:clrMapOvr>
+</p:sld>
+</file>
+
+<file path=ppt/slides/slide6.xml><?xml version="1.0" encoding="utf-8"?>
+<p:sld xmlns:a="http://schemas.openxmlformats.org/drawingml/2006/main" xmlns:r="http://schemas.openxmlformats.org/officeDocument/2006/relationships" xmlns:p="http://schemas.openxmlformats.org/presentationml/2006/main">
+  <p:cSld>
+    <p:spTree>
+      <p:nvGrpSpPr>
+        <p:cNvPr id="1" name=""/>
+        <p:cNvGrpSpPr/>
+        <p:nvPr/>
+      </p:nvGrpSpPr>
+      <p:grpSpPr>
+        <a:xfrm>
+          <a:off x="0" y="0"/>
+          <a:ext cx="0" cy="0"/>
+          <a:chOff x="0" y="0"/>
+          <a:chExt cx="0" cy="0"/>
+        </a:xfrm>
+      </p:grpSpPr>
+      <p:sp>
+        <p:nvSpPr>
+          <p:cNvPr id="2" name="Title 1">
+            <a:extLst>
+              <a:ext uri="{FF2B5EF4-FFF2-40B4-BE49-F238E27FC236}">
+                <a16:creationId xmlns:a16="http://schemas.microsoft.com/office/drawing/2014/main" id="{5EC46B65-1AEE-4BB2-AC7B-8C134382E3D1}"/>
+              </a:ext>
+            </a:extLst>
+          </p:cNvPr>
+          <p:cNvSpPr>
+            <a:spLocks noGrp="1"/>
+          </p:cNvSpPr>
+          <p:nvPr>
+            <p:ph type="ctrTitle"/>
+          </p:nvPr>
+        </p:nvSpPr>
+        <p:spPr>
+          <a:xfrm>
+            <a:off x="1154955" y="1344724"/>
+            <a:ext cx="8825658" cy="2677648"/>
+          </a:xfrm>
+        </p:spPr>
+        <p:txBody>
+          <a:bodyPr/>
+          <a:lstStyle/>
+          <a:p>
+            <a:r>
+              <a:rPr lang="it-IT" dirty="0"/>
+              <a:t>Architecture</a:t>
+            </a:r>
+          </a:p>
+        </p:txBody>
+      </p:sp>
+    </p:spTree>
+    <p:extLst>
+      <p:ext uri="{BB962C8B-B14F-4D97-AF65-F5344CB8AC3E}">
+        <p14:creationId xmlns:p14="http://schemas.microsoft.com/office/powerpoint/2010/main" val="2506800857"/>
+      </p:ext>
+    </p:extLst>
+  </p:cSld>
+  <p:clrMapOvr>
+    <a:masterClrMapping/>
+  </p:clrMapOvr>
+</p:sld>
+</file>
+
+<file path=ppt/slides/slide7.xml><?xml version="1.0" encoding="utf-8"?>
 <p:sld xmlns:a="http://schemas.openxmlformats.org/drawingml/2006/main" xmlns:r="http://schemas.openxmlformats.org/officeDocument/2006/relationships" xmlns:p="http://schemas.openxmlformats.org/presentationml/2006/main">
   <p:cSld>
     <p:spTree>
@@ -13888,908 +15593,6 @@
 </p:sld>
 </file>
 
-<file path=ppt/slides/slide4.xml><?xml version="1.0" encoding="utf-8"?>
-<p:sld xmlns:a="http://schemas.openxmlformats.org/drawingml/2006/main" xmlns:r="http://schemas.openxmlformats.org/officeDocument/2006/relationships" xmlns:p="http://schemas.openxmlformats.org/presentationml/2006/main">
-  <p:cSld>
-    <p:spTree>
-      <p:nvGrpSpPr>
-        <p:cNvPr id="1" name=""/>
-        <p:cNvGrpSpPr/>
-        <p:nvPr/>
-      </p:nvGrpSpPr>
-      <p:grpSpPr>
-        <a:xfrm>
-          <a:off x="0" y="0"/>
-          <a:ext cx="0" cy="0"/>
-          <a:chOff x="0" y="0"/>
-          <a:chExt cx="0" cy="0"/>
-        </a:xfrm>
-      </p:grpSpPr>
-      <p:sp>
-        <p:nvSpPr>
-          <p:cNvPr id="2" name="Title 1">
-            <a:extLst>
-              <a:ext uri="{FF2B5EF4-FFF2-40B4-BE49-F238E27FC236}">
-                <a16:creationId xmlns:a16="http://schemas.microsoft.com/office/drawing/2014/main" id="{EBB11B71-9D4A-4B5E-A6C8-3C9A9EAD78C5}"/>
-              </a:ext>
-            </a:extLst>
-          </p:cNvPr>
-          <p:cNvSpPr>
-            <a:spLocks noGrp="1"/>
-          </p:cNvSpPr>
-          <p:nvPr>
-            <p:ph type="title"/>
-          </p:nvPr>
-        </p:nvSpPr>
-        <p:spPr/>
-        <p:txBody>
-          <a:bodyPr/>
-          <a:lstStyle/>
-          <a:p>
-            <a:r>
-              <a:rPr lang="it-IT" dirty="0"/>
-              <a:t>Features</a:t>
-            </a:r>
-          </a:p>
-        </p:txBody>
-      </p:sp>
-      <p:sp>
-        <p:nvSpPr>
-          <p:cNvPr id="3" name="Content Placeholder 2">
-            <a:extLst>
-              <a:ext uri="{FF2B5EF4-FFF2-40B4-BE49-F238E27FC236}">
-                <a16:creationId xmlns:a16="http://schemas.microsoft.com/office/drawing/2014/main" id="{95DF66A6-0BB2-4AF1-8C45-611659F46837}"/>
-              </a:ext>
-            </a:extLst>
-          </p:cNvPr>
-          <p:cNvSpPr>
-            <a:spLocks noGrp="1"/>
-          </p:cNvSpPr>
-          <p:nvPr>
-            <p:ph idx="1"/>
-          </p:nvPr>
-        </p:nvSpPr>
-        <p:spPr/>
-        <p:txBody>
-          <a:bodyPr/>
-          <a:lstStyle/>
-          <a:p>
-            <a:r>
-              <a:rPr lang="it-IT" dirty="0"/>
-              <a:t>The features </a:t>
-            </a:r>
-            <a:r>
-              <a:rPr lang="it-IT" dirty="0" err="1"/>
-              <a:t>provided</a:t>
-            </a:r>
-            <a:r>
-              <a:rPr lang="it-IT" dirty="0"/>
-              <a:t> by the </a:t>
-            </a:r>
-            <a:r>
-              <a:rPr lang="it-IT" dirty="0" err="1"/>
-              <a:t>application</a:t>
-            </a:r>
-            <a:r>
-              <a:rPr lang="it-IT" dirty="0"/>
-              <a:t> are </a:t>
-            </a:r>
-            <a:r>
-              <a:rPr lang="it-IT" dirty="0" err="1"/>
-              <a:t>different</a:t>
-            </a:r>
-            <a:r>
-              <a:rPr lang="it-IT" dirty="0"/>
-              <a:t> </a:t>
-            </a:r>
-            <a:r>
-              <a:rPr lang="it-IT" dirty="0" err="1"/>
-              <a:t>according</a:t>
-            </a:r>
-            <a:r>
-              <a:rPr lang="it-IT" dirty="0"/>
-              <a:t> to the account </a:t>
-            </a:r>
-            <a:r>
-              <a:rPr lang="it-IT" dirty="0" err="1"/>
-              <a:t>type</a:t>
-            </a:r>
-            <a:r>
-              <a:rPr lang="it-IT" dirty="0"/>
-              <a:t> of the user, </a:t>
-            </a:r>
-            <a:r>
-              <a:rPr lang="it-IT" dirty="0" err="1"/>
-              <a:t>which</a:t>
-            </a:r>
-            <a:r>
-              <a:rPr lang="it-IT" dirty="0"/>
-              <a:t> can be:</a:t>
-            </a:r>
-          </a:p>
-          <a:p>
-            <a:pPr lvl="1"/>
-            <a:r>
-              <a:rPr lang="it-IT" dirty="0"/>
-              <a:t>Client</a:t>
-            </a:r>
-          </a:p>
-          <a:p>
-            <a:pPr lvl="1"/>
-            <a:r>
-              <a:rPr lang="it-IT" dirty="0" err="1"/>
-              <a:t>Caregiver</a:t>
-            </a:r>
-            <a:endParaRPr lang="it-IT" dirty="0"/>
-          </a:p>
-        </p:txBody>
-      </p:sp>
-    </p:spTree>
-    <p:extLst>
-      <p:ext uri="{BB962C8B-B14F-4D97-AF65-F5344CB8AC3E}">
-        <p14:creationId xmlns:p14="http://schemas.microsoft.com/office/powerpoint/2010/main" val="2687509695"/>
-      </p:ext>
-    </p:extLst>
-  </p:cSld>
-  <p:clrMapOvr>
-    <a:masterClrMapping/>
-  </p:clrMapOvr>
-</p:sld>
-</file>
-
-<file path=ppt/slides/slide5.xml><?xml version="1.0" encoding="utf-8"?>
-<p:sld xmlns:a="http://schemas.openxmlformats.org/drawingml/2006/main" xmlns:r="http://schemas.openxmlformats.org/officeDocument/2006/relationships" xmlns:p="http://schemas.openxmlformats.org/presentationml/2006/main">
-  <p:cSld>
-    <p:spTree>
-      <p:nvGrpSpPr>
-        <p:cNvPr id="1" name=""/>
-        <p:cNvGrpSpPr/>
-        <p:nvPr/>
-      </p:nvGrpSpPr>
-      <p:grpSpPr>
-        <a:xfrm>
-          <a:off x="0" y="0"/>
-          <a:ext cx="0" cy="0"/>
-          <a:chOff x="0" y="0"/>
-          <a:chExt cx="0" cy="0"/>
-        </a:xfrm>
-      </p:grpSpPr>
-      <p:sp>
-        <p:nvSpPr>
-          <p:cNvPr id="2" name="Title 1">
-            <a:extLst>
-              <a:ext uri="{FF2B5EF4-FFF2-40B4-BE49-F238E27FC236}">
-                <a16:creationId xmlns:a16="http://schemas.microsoft.com/office/drawing/2014/main" id="{2E35FCF9-6A7A-4E4E-B642-1B47965D96B9}"/>
-              </a:ext>
-            </a:extLst>
-          </p:cNvPr>
-          <p:cNvSpPr>
-            <a:spLocks noGrp="1"/>
-          </p:cNvSpPr>
-          <p:nvPr>
-            <p:ph type="title"/>
-          </p:nvPr>
-        </p:nvSpPr>
-        <p:spPr/>
-        <p:txBody>
-          <a:bodyPr/>
-          <a:lstStyle/>
-          <a:p>
-            <a:r>
-              <a:rPr lang="it-IT" dirty="0"/>
-              <a:t>Client Features</a:t>
-            </a:r>
-          </a:p>
-        </p:txBody>
-      </p:sp>
-      <p:sp>
-        <p:nvSpPr>
-          <p:cNvPr id="3" name="Content Placeholder 2">
-            <a:extLst>
-              <a:ext uri="{FF2B5EF4-FFF2-40B4-BE49-F238E27FC236}">
-                <a16:creationId xmlns:a16="http://schemas.microsoft.com/office/drawing/2014/main" id="{30AD45DB-B722-49BF-A65D-31889FF890D7}"/>
-              </a:ext>
-            </a:extLst>
-          </p:cNvPr>
-          <p:cNvSpPr>
-            <a:spLocks noGrp="1"/>
-          </p:cNvSpPr>
-          <p:nvPr>
-            <p:ph idx="1"/>
-          </p:nvPr>
-        </p:nvSpPr>
-        <p:spPr/>
-        <p:txBody>
-          <a:bodyPr/>
-          <a:lstStyle/>
-          <a:p>
-            <a:r>
-              <a:rPr lang="it-IT" dirty="0"/>
-              <a:t>A user </a:t>
-            </a:r>
-            <a:r>
-              <a:rPr lang="it-IT" dirty="0" err="1"/>
-              <a:t>registered</a:t>
-            </a:r>
-            <a:r>
-              <a:rPr lang="it-IT" dirty="0"/>
-              <a:t> </a:t>
-            </a:r>
-            <a:r>
-              <a:rPr lang="it-IT" dirty="0" err="1"/>
-              <a:t>as</a:t>
-            </a:r>
-            <a:r>
-              <a:rPr lang="it-IT" dirty="0"/>
-              <a:t> a customer can:</a:t>
-            </a:r>
-          </a:p>
-          <a:p>
-            <a:pPr lvl="1"/>
-            <a:r>
-              <a:rPr lang="it-IT" dirty="0"/>
-              <a:t>Scroll the list of the </a:t>
-            </a:r>
-            <a:r>
-              <a:rPr lang="it-IT" dirty="0" err="1"/>
-              <a:t>registered</a:t>
-            </a:r>
-            <a:r>
-              <a:rPr lang="it-IT" dirty="0"/>
-              <a:t> </a:t>
-            </a:r>
-            <a:r>
-              <a:rPr lang="it-IT" dirty="0" err="1"/>
-              <a:t>caregivers</a:t>
-            </a:r>
-            <a:endParaRPr lang="it-IT" dirty="0"/>
-          </a:p>
-          <a:p>
-            <a:pPr lvl="1"/>
-            <a:r>
-              <a:rPr lang="it-IT" dirty="0" err="1"/>
-              <a:t>Search</a:t>
-            </a:r>
-            <a:r>
-              <a:rPr lang="it-IT" dirty="0"/>
-              <a:t> the </a:t>
-            </a:r>
-            <a:r>
-              <a:rPr lang="it-IT" dirty="0" err="1"/>
-              <a:t>caregivers</a:t>
-            </a:r>
-            <a:r>
-              <a:rPr lang="it-IT" dirty="0"/>
-              <a:t> </a:t>
-            </a:r>
-            <a:r>
-              <a:rPr lang="it-IT" dirty="0" err="1"/>
-              <a:t>according</a:t>
-            </a:r>
-            <a:r>
-              <a:rPr lang="it-IT" dirty="0"/>
-              <a:t> to </a:t>
-            </a:r>
-            <a:r>
-              <a:rPr lang="it-IT" dirty="0" err="1"/>
-              <a:t>its</a:t>
-            </a:r>
-            <a:r>
-              <a:rPr lang="it-IT" dirty="0"/>
-              <a:t> city</a:t>
-            </a:r>
-          </a:p>
-          <a:p>
-            <a:pPr lvl="1"/>
-            <a:r>
-              <a:rPr lang="it-IT" dirty="0" err="1"/>
-              <a:t>View</a:t>
-            </a:r>
-            <a:r>
-              <a:rPr lang="it-IT" dirty="0"/>
-              <a:t> a </a:t>
-            </a:r>
-            <a:r>
-              <a:rPr lang="it-IT" dirty="0" err="1"/>
-              <a:t>specific</a:t>
-            </a:r>
-            <a:r>
-              <a:rPr lang="it-IT" dirty="0"/>
-              <a:t> </a:t>
-            </a:r>
-            <a:r>
-              <a:rPr lang="it-IT" dirty="0" err="1"/>
-              <a:t>caregiver</a:t>
-            </a:r>
-            <a:r>
-              <a:rPr lang="it-IT" dirty="0"/>
-              <a:t> </a:t>
-            </a:r>
-            <a:r>
-              <a:rPr lang="it-IT" dirty="0" err="1"/>
-              <a:t>profile</a:t>
-            </a:r>
-            <a:r>
-              <a:rPr lang="it-IT" dirty="0"/>
-              <a:t> </a:t>
-            </a:r>
-          </a:p>
-          <a:p>
-            <a:pPr lvl="1"/>
-            <a:r>
-              <a:rPr lang="it-IT" dirty="0" err="1"/>
-              <a:t>Leave</a:t>
-            </a:r>
-            <a:r>
-              <a:rPr lang="it-IT" dirty="0"/>
-              <a:t> a review on a </a:t>
-            </a:r>
-            <a:r>
-              <a:rPr lang="it-IT" dirty="0" err="1"/>
-              <a:t>caregiver</a:t>
-            </a:r>
-            <a:r>
-              <a:rPr lang="it-IT" dirty="0"/>
-              <a:t> </a:t>
-            </a:r>
-            <a:r>
-              <a:rPr lang="it-IT" dirty="0" err="1"/>
-              <a:t>profile</a:t>
-            </a:r>
-            <a:endParaRPr lang="it-IT" dirty="0"/>
-          </a:p>
-        </p:txBody>
-      </p:sp>
-      <p:pic>
-        <p:nvPicPr>
-          <p:cNvPr id="7" name="Picture 6">
-            <a:extLst>
-              <a:ext uri="{FF2B5EF4-FFF2-40B4-BE49-F238E27FC236}">
-                <a16:creationId xmlns:a16="http://schemas.microsoft.com/office/drawing/2014/main" id="{2C6BDBB8-6075-4360-A1B4-E8F2F5FF05C7}"/>
-              </a:ext>
-            </a:extLst>
-          </p:cNvPr>
-          <p:cNvPicPr>
-            <a:picLocks noChangeAspect="1"/>
-          </p:cNvPicPr>
-          <p:nvPr/>
-        </p:nvPicPr>
-        <p:blipFill>
-          <a:blip r:embed="rId2"/>
-          <a:stretch>
-            <a:fillRect/>
-          </a:stretch>
-        </p:blipFill>
-        <p:spPr>
-          <a:xfrm>
-            <a:off x="7456602" y="3881093"/>
-            <a:ext cx="4295480" cy="2684675"/>
-          </a:xfrm>
-          <a:prstGeom prst="rect">
-            <a:avLst/>
-          </a:prstGeom>
-        </p:spPr>
-      </p:pic>
-    </p:spTree>
-    <p:extLst>
-      <p:ext uri="{BB962C8B-B14F-4D97-AF65-F5344CB8AC3E}">
-        <p14:creationId xmlns:p14="http://schemas.microsoft.com/office/powerpoint/2010/main" val="2548685359"/>
-      </p:ext>
-    </p:extLst>
-  </p:cSld>
-  <p:clrMapOvr>
-    <a:masterClrMapping/>
-  </p:clrMapOvr>
-</p:sld>
-</file>
-
-<file path=ppt/slides/slide6.xml><?xml version="1.0" encoding="utf-8"?>
-<p:sld xmlns:a="http://schemas.openxmlformats.org/drawingml/2006/main" xmlns:r="http://schemas.openxmlformats.org/officeDocument/2006/relationships" xmlns:p="http://schemas.openxmlformats.org/presentationml/2006/main">
-  <p:cSld>
-    <p:spTree>
-      <p:nvGrpSpPr>
-        <p:cNvPr id="1" name=""/>
-        <p:cNvGrpSpPr/>
-        <p:nvPr/>
-      </p:nvGrpSpPr>
-      <p:grpSpPr>
-        <a:xfrm>
-          <a:off x="0" y="0"/>
-          <a:ext cx="0" cy="0"/>
-          <a:chOff x="0" y="0"/>
-          <a:chExt cx="0" cy="0"/>
-        </a:xfrm>
-      </p:grpSpPr>
-      <p:sp>
-        <p:nvSpPr>
-          <p:cNvPr id="2" name="Title 1">
-            <a:extLst>
-              <a:ext uri="{FF2B5EF4-FFF2-40B4-BE49-F238E27FC236}">
-                <a16:creationId xmlns:a16="http://schemas.microsoft.com/office/drawing/2014/main" id="{2E35FCF9-6A7A-4E4E-B642-1B47965D96B9}"/>
-              </a:ext>
-            </a:extLst>
-          </p:cNvPr>
-          <p:cNvSpPr>
-            <a:spLocks noGrp="1"/>
-          </p:cNvSpPr>
-          <p:nvPr>
-            <p:ph type="title"/>
-          </p:nvPr>
-        </p:nvSpPr>
-        <p:spPr/>
-        <p:txBody>
-          <a:bodyPr/>
-          <a:lstStyle/>
-          <a:p>
-            <a:r>
-              <a:rPr lang="it-IT" dirty="0" err="1"/>
-              <a:t>Caregiver</a:t>
-            </a:r>
-            <a:r>
-              <a:rPr lang="it-IT" dirty="0"/>
-              <a:t> Features</a:t>
-            </a:r>
-          </a:p>
-        </p:txBody>
-      </p:sp>
-      <p:sp>
-        <p:nvSpPr>
-          <p:cNvPr id="3" name="Content Placeholder 2">
-            <a:extLst>
-              <a:ext uri="{FF2B5EF4-FFF2-40B4-BE49-F238E27FC236}">
-                <a16:creationId xmlns:a16="http://schemas.microsoft.com/office/drawing/2014/main" id="{30AD45DB-B722-49BF-A65D-31889FF890D7}"/>
-              </a:ext>
-            </a:extLst>
-          </p:cNvPr>
-          <p:cNvSpPr>
-            <a:spLocks noGrp="1"/>
-          </p:cNvSpPr>
-          <p:nvPr>
-            <p:ph idx="1"/>
-          </p:nvPr>
-        </p:nvSpPr>
-        <p:spPr/>
-        <p:txBody>
-          <a:bodyPr/>
-          <a:lstStyle/>
-          <a:p>
-            <a:r>
-              <a:rPr lang="it-IT" dirty="0"/>
-              <a:t>A user </a:t>
-            </a:r>
-            <a:r>
-              <a:rPr lang="it-IT" dirty="0" err="1"/>
-              <a:t>registered</a:t>
-            </a:r>
-            <a:r>
-              <a:rPr lang="it-IT" dirty="0"/>
-              <a:t> </a:t>
-            </a:r>
-            <a:r>
-              <a:rPr lang="it-IT" dirty="0" err="1"/>
-              <a:t>as</a:t>
-            </a:r>
-            <a:r>
-              <a:rPr lang="it-IT" dirty="0"/>
-              <a:t> a </a:t>
-            </a:r>
-            <a:r>
-              <a:rPr lang="it-IT" dirty="0" err="1"/>
-              <a:t>caregiver</a:t>
-            </a:r>
-            <a:r>
-              <a:rPr lang="it-IT" dirty="0"/>
-              <a:t> </a:t>
-            </a:r>
-            <a:r>
-              <a:rPr lang="it-IT" dirty="0" err="1"/>
-              <a:t>is</a:t>
-            </a:r>
-            <a:r>
-              <a:rPr lang="it-IT" dirty="0"/>
-              <a:t> a passive user </a:t>
-            </a:r>
-            <a:r>
-              <a:rPr lang="it-IT" dirty="0" err="1"/>
-              <a:t>which</a:t>
-            </a:r>
-            <a:r>
-              <a:rPr lang="it-IT" dirty="0"/>
-              <a:t> can:</a:t>
-            </a:r>
-          </a:p>
-          <a:p>
-            <a:pPr lvl="1"/>
-            <a:r>
-              <a:rPr lang="it-IT" dirty="0" err="1"/>
-              <a:t>Register</a:t>
-            </a:r>
-            <a:r>
-              <a:rPr lang="it-IT" dirty="0"/>
-              <a:t> to the system</a:t>
-            </a:r>
-          </a:p>
-          <a:p>
-            <a:pPr lvl="1"/>
-            <a:r>
-              <a:rPr lang="it-IT" dirty="0" err="1"/>
-              <a:t>View</a:t>
-            </a:r>
-            <a:r>
-              <a:rPr lang="it-IT" dirty="0"/>
-              <a:t> the reviews </a:t>
-            </a:r>
-            <a:r>
-              <a:rPr lang="it-IT" dirty="0" err="1"/>
-              <a:t>left</a:t>
-            </a:r>
-            <a:r>
-              <a:rPr lang="it-IT" dirty="0"/>
-              <a:t> by client users</a:t>
-            </a:r>
-          </a:p>
-          <a:p>
-            <a:pPr lvl="1"/>
-            <a:r>
-              <a:rPr lang="it-IT" dirty="0" err="1"/>
-              <a:t>Receive</a:t>
-            </a:r>
-            <a:r>
-              <a:rPr lang="it-IT" dirty="0"/>
-              <a:t> </a:t>
-            </a:r>
-            <a:r>
-              <a:rPr lang="it-IT" dirty="0" err="1"/>
-              <a:t>notification</a:t>
-            </a:r>
-            <a:r>
-              <a:rPr lang="it-IT" dirty="0"/>
-              <a:t> of a new review</a:t>
-            </a:r>
-          </a:p>
-        </p:txBody>
-      </p:sp>
-      <p:pic>
-        <p:nvPicPr>
-          <p:cNvPr id="8" name="Picture 7">
-            <a:extLst>
-              <a:ext uri="{FF2B5EF4-FFF2-40B4-BE49-F238E27FC236}">
-                <a16:creationId xmlns:a16="http://schemas.microsoft.com/office/drawing/2014/main" id="{72D18156-771B-49DC-9DFE-1D48A3DD07DF}"/>
-              </a:ext>
-            </a:extLst>
-          </p:cNvPr>
-          <p:cNvPicPr>
-            <a:picLocks noChangeAspect="1"/>
-          </p:cNvPicPr>
-          <p:nvPr/>
-        </p:nvPicPr>
-        <p:blipFill>
-          <a:blip r:embed="rId2"/>
-          <a:stretch>
-            <a:fillRect/>
-          </a:stretch>
-        </p:blipFill>
-        <p:spPr>
-          <a:xfrm>
-            <a:off x="7533314" y="3364684"/>
-            <a:ext cx="2922864" cy="2922864"/>
-          </a:xfrm>
-          <a:prstGeom prst="rect">
-            <a:avLst/>
-          </a:prstGeom>
-        </p:spPr>
-      </p:pic>
-    </p:spTree>
-    <p:extLst>
-      <p:ext uri="{BB962C8B-B14F-4D97-AF65-F5344CB8AC3E}">
-        <p14:creationId xmlns:p14="http://schemas.microsoft.com/office/powerpoint/2010/main" val="3773927568"/>
-      </p:ext>
-    </p:extLst>
-  </p:cSld>
-  <p:clrMapOvr>
-    <a:masterClrMapping/>
-  </p:clrMapOvr>
-</p:sld>
-</file>
-
-<file path=ppt/slides/slide7.xml><?xml version="1.0" encoding="utf-8"?>
-<p:sld xmlns:a="http://schemas.openxmlformats.org/drawingml/2006/main" xmlns:r="http://schemas.openxmlformats.org/officeDocument/2006/relationships" xmlns:p="http://schemas.openxmlformats.org/presentationml/2006/main">
-  <p:cSld>
-    <p:spTree>
-      <p:nvGrpSpPr>
-        <p:cNvPr id="1" name=""/>
-        <p:cNvGrpSpPr/>
-        <p:nvPr/>
-      </p:nvGrpSpPr>
-      <p:grpSpPr>
-        <a:xfrm>
-          <a:off x="0" y="0"/>
-          <a:ext cx="0" cy="0"/>
-          <a:chOff x="0" y="0"/>
-          <a:chExt cx="0" cy="0"/>
-        </a:xfrm>
-      </p:grpSpPr>
-      <p:sp>
-        <p:nvSpPr>
-          <p:cNvPr id="2" name="Title 1">
-            <a:extLst>
-              <a:ext uri="{FF2B5EF4-FFF2-40B4-BE49-F238E27FC236}">
-                <a16:creationId xmlns:a16="http://schemas.microsoft.com/office/drawing/2014/main" id="{B17E8E7F-4ACF-4217-8E35-84D63A5207BF}"/>
-              </a:ext>
-            </a:extLst>
-          </p:cNvPr>
-          <p:cNvSpPr>
-            <a:spLocks noGrp="1"/>
-          </p:cNvSpPr>
-          <p:nvPr>
-            <p:ph type="title"/>
-          </p:nvPr>
-        </p:nvSpPr>
-        <p:spPr/>
-        <p:txBody>
-          <a:bodyPr/>
-          <a:lstStyle/>
-          <a:p>
-            <a:r>
-              <a:rPr lang="it-IT" dirty="0"/>
-              <a:t>Development and Testing </a:t>
-            </a:r>
-            <a:r>
-              <a:rPr lang="it-IT" dirty="0" err="1"/>
-              <a:t>approach</a:t>
-            </a:r>
-            <a:r>
-              <a:rPr lang="it-IT" dirty="0"/>
-              <a:t> </a:t>
-            </a:r>
-          </a:p>
-        </p:txBody>
-      </p:sp>
-      <p:sp>
-        <p:nvSpPr>
-          <p:cNvPr id="3" name="Content Placeholder 2">
-            <a:extLst>
-              <a:ext uri="{FF2B5EF4-FFF2-40B4-BE49-F238E27FC236}">
-                <a16:creationId xmlns:a16="http://schemas.microsoft.com/office/drawing/2014/main" id="{97242647-C093-4A20-81BE-A966AD6A42B0}"/>
-              </a:ext>
-            </a:extLst>
-          </p:cNvPr>
-          <p:cNvSpPr>
-            <a:spLocks noGrp="1"/>
-          </p:cNvSpPr>
-          <p:nvPr>
-            <p:ph idx="1"/>
-          </p:nvPr>
-        </p:nvSpPr>
-        <p:spPr/>
-        <p:txBody>
-          <a:bodyPr/>
-          <a:lstStyle/>
-          <a:p>
-            <a:r>
-              <a:rPr lang="it-IT" dirty="0" err="1"/>
-              <a:t>We</a:t>
-            </a:r>
-            <a:r>
-              <a:rPr lang="it-IT" dirty="0"/>
-              <a:t> </a:t>
-            </a:r>
-            <a:r>
-              <a:rPr lang="it-IT" dirty="0" err="1"/>
-              <a:t>have</a:t>
-            </a:r>
-            <a:r>
-              <a:rPr lang="it-IT" dirty="0"/>
-              <a:t> </a:t>
-            </a:r>
-            <a:r>
-              <a:rPr lang="it-IT" dirty="0" err="1"/>
-              <a:t>followed</a:t>
-            </a:r>
-            <a:r>
-              <a:rPr lang="it-IT" dirty="0"/>
-              <a:t> a bottom-up </a:t>
-            </a:r>
-            <a:r>
-              <a:rPr lang="it-IT" dirty="0" err="1"/>
-              <a:t>development</a:t>
-            </a:r>
-            <a:r>
-              <a:rPr lang="it-IT" dirty="0"/>
-              <a:t> </a:t>
-            </a:r>
-            <a:r>
-              <a:rPr lang="it-IT" dirty="0" err="1"/>
-              <a:t>approach</a:t>
-            </a:r>
-            <a:r>
-              <a:rPr lang="it-IT" dirty="0"/>
-              <a:t> </a:t>
-            </a:r>
-            <a:r>
-              <a:rPr lang="it-IT" dirty="0" err="1"/>
-              <a:t>starting</a:t>
-            </a:r>
-            <a:r>
-              <a:rPr lang="it-IT" dirty="0"/>
-              <a:t> from </a:t>
-            </a:r>
-            <a:r>
-              <a:rPr lang="it-IT" dirty="0" err="1"/>
-              <a:t>independent</a:t>
-            </a:r>
-            <a:r>
-              <a:rPr lang="it-IT" dirty="0"/>
-              <a:t> and </a:t>
-            </a:r>
-            <a:r>
-              <a:rPr lang="it-IT" dirty="0" err="1"/>
-              <a:t>atomic</a:t>
-            </a:r>
-            <a:r>
-              <a:rPr lang="it-IT" dirty="0"/>
-              <a:t> </a:t>
-            </a:r>
-            <a:r>
-              <a:rPr lang="it-IT" dirty="0" err="1"/>
-              <a:t>components</a:t>
-            </a:r>
-            <a:r>
-              <a:rPr lang="it-IT" dirty="0"/>
-              <a:t> </a:t>
-            </a:r>
-            <a:r>
-              <a:rPr lang="it-IT" dirty="0" err="1"/>
-              <a:t>which</a:t>
-            </a:r>
-            <a:r>
-              <a:rPr lang="it-IT" dirty="0"/>
-              <a:t> </a:t>
-            </a:r>
-            <a:r>
-              <a:rPr lang="it-IT" dirty="0" err="1"/>
-              <a:t>were</a:t>
-            </a:r>
-            <a:r>
-              <a:rPr lang="it-IT" dirty="0"/>
-              <a:t> </a:t>
-            </a:r>
-            <a:r>
-              <a:rPr lang="it-IT" dirty="0" err="1"/>
-              <a:t>progessively</a:t>
-            </a:r>
-            <a:r>
-              <a:rPr lang="it-IT" dirty="0"/>
-              <a:t> </a:t>
-            </a:r>
-            <a:r>
-              <a:rPr lang="it-IT" dirty="0" err="1"/>
-              <a:t>integrated</a:t>
-            </a:r>
-            <a:r>
-              <a:rPr lang="it-IT" dirty="0"/>
-              <a:t> in more </a:t>
-            </a:r>
-            <a:r>
-              <a:rPr lang="it-IT" dirty="0" err="1"/>
-              <a:t>complex</a:t>
-            </a:r>
-            <a:r>
-              <a:rPr lang="it-IT" dirty="0"/>
-              <a:t> widgets and </a:t>
-            </a:r>
-            <a:r>
-              <a:rPr lang="it-IT" dirty="0" err="1"/>
-              <a:t>components</a:t>
-            </a:r>
-            <a:endParaRPr lang="it-IT" dirty="0"/>
-          </a:p>
-          <a:p>
-            <a:r>
-              <a:rPr lang="it-IT" dirty="0" err="1"/>
-              <a:t>Each</a:t>
-            </a:r>
-            <a:r>
-              <a:rPr lang="it-IT" dirty="0"/>
-              <a:t> </a:t>
-            </a:r>
-            <a:r>
-              <a:rPr lang="it-IT" dirty="0" err="1"/>
-              <a:t>separable</a:t>
-            </a:r>
-            <a:r>
-              <a:rPr lang="it-IT" dirty="0"/>
-              <a:t> widgets </a:t>
-            </a:r>
-            <a:r>
-              <a:rPr lang="it-IT" dirty="0" err="1"/>
-              <a:t>was</a:t>
-            </a:r>
-            <a:r>
-              <a:rPr lang="it-IT" dirty="0"/>
-              <a:t> </a:t>
-            </a:r>
-            <a:r>
-              <a:rPr lang="it-IT" dirty="0" err="1"/>
-              <a:t>tested</a:t>
-            </a:r>
-            <a:r>
-              <a:rPr lang="it-IT" dirty="0"/>
-              <a:t> following the </a:t>
-            </a:r>
-            <a:r>
-              <a:rPr lang="it-IT" dirty="0" err="1"/>
-              <a:t>approach</a:t>
-            </a:r>
-            <a:r>
-              <a:rPr lang="it-IT" dirty="0"/>
-              <a:t> of </a:t>
-            </a:r>
-            <a:r>
-              <a:rPr lang="it-IT" dirty="0" err="1"/>
-              <a:t>Futter</a:t>
-            </a:r>
-            <a:r>
-              <a:rPr lang="it-IT" dirty="0"/>
-              <a:t> Widget </a:t>
-            </a:r>
-            <a:r>
-              <a:rPr lang="it-IT" dirty="0" err="1"/>
-              <a:t>tests</a:t>
-            </a:r>
-            <a:endParaRPr lang="it-IT" dirty="0"/>
-          </a:p>
-          <a:p>
-            <a:pPr marL="457200" lvl="1" indent="0">
-              <a:buNone/>
-            </a:pPr>
-            <a:endParaRPr lang="it-IT" dirty="0"/>
-          </a:p>
-        </p:txBody>
-      </p:sp>
-      <p:pic>
-        <p:nvPicPr>
-          <p:cNvPr id="5" name="Picture 4" descr="Text&#10;&#10;Description automatically generated">
-            <a:extLst>
-              <a:ext uri="{FF2B5EF4-FFF2-40B4-BE49-F238E27FC236}">
-                <a16:creationId xmlns:a16="http://schemas.microsoft.com/office/drawing/2014/main" id="{6A3E2B86-373C-49F5-AB8C-D10C5EF514AC}"/>
-              </a:ext>
-            </a:extLst>
-          </p:cNvPr>
-          <p:cNvPicPr>
-            <a:picLocks noChangeAspect="1"/>
-          </p:cNvPicPr>
-          <p:nvPr/>
-        </p:nvPicPr>
-        <p:blipFill>
-          <a:blip r:embed="rId2"/>
-          <a:stretch>
-            <a:fillRect/>
-          </a:stretch>
-        </p:blipFill>
-        <p:spPr>
-          <a:xfrm>
-            <a:off x="3343373" y="3987358"/>
-            <a:ext cx="3681921" cy="2743770"/>
-          </a:xfrm>
-          <a:prstGeom prst="rect">
-            <a:avLst/>
-          </a:prstGeom>
-        </p:spPr>
-      </p:pic>
-    </p:spTree>
-    <p:extLst>
-      <p:ext uri="{BB962C8B-B14F-4D97-AF65-F5344CB8AC3E}">
-        <p14:creationId xmlns:p14="http://schemas.microsoft.com/office/powerpoint/2010/main" val="153822285"/>
-      </p:ext>
-    </p:extLst>
-  </p:cSld>
-  <p:clrMapOvr>
-    <a:masterClrMapping/>
-  </p:clrMapOvr>
-</p:sld>
-</file>
-
 <file path=ppt/slides/slide8.xml><?xml version="1.0" encoding="utf-8"?>
 <p:sld xmlns:a="http://schemas.openxmlformats.org/drawingml/2006/main" xmlns:r="http://schemas.openxmlformats.org/officeDocument/2006/relationships" xmlns:p="http://schemas.openxmlformats.org/presentationml/2006/main">
   <p:cSld>
@@ -14812,7 +15615,7 @@
           <p:cNvPr id="2" name="Title 1">
             <a:extLst>
               <a:ext uri="{FF2B5EF4-FFF2-40B4-BE49-F238E27FC236}">
-                <a16:creationId xmlns:a16="http://schemas.microsoft.com/office/drawing/2014/main" id="{5D9B0ABD-4C2C-43B5-BBAA-C48B8B591180}"/>
+                <a16:creationId xmlns:a16="http://schemas.microsoft.com/office/drawing/2014/main" id="{A7448847-A966-469F-AF1E-11ACE7C99CD6}"/>
               </a:ext>
             </a:extLst>
           </p:cNvPr>
@@ -14830,21 +15633,629 @@
           <a:p>
             <a:r>
               <a:rPr lang="it-IT" dirty="0" err="1"/>
-              <a:t>Now</a:t>
+              <a:t>Why</a:t>
             </a:r>
             <a:r>
               <a:rPr lang="it-IT" dirty="0"/>
-              <a:t>…</a:t>
+              <a:t> Flutter ?</a:t>
             </a:r>
           </a:p>
         </p:txBody>
       </p:sp>
+      <p:graphicFrame>
+        <p:nvGraphicFramePr>
+          <p:cNvPr id="5" name="Table 5">
+            <a:extLst>
+              <a:ext uri="{FF2B5EF4-FFF2-40B4-BE49-F238E27FC236}">
+                <a16:creationId xmlns:a16="http://schemas.microsoft.com/office/drawing/2014/main" id="{9955D970-88D4-4FCA-AE01-5739F28B1402}"/>
+              </a:ext>
+            </a:extLst>
+          </p:cNvPr>
+          <p:cNvGraphicFramePr>
+            <a:graphicFrameLocks noGrp="1"/>
+          </p:cNvGraphicFramePr>
+          <p:nvPr>
+            <p:ph idx="1"/>
+            <p:extLst>
+              <p:ext uri="{D42A27DB-BD31-4B8C-83A1-F6EECF244321}">
+                <p14:modId xmlns:p14="http://schemas.microsoft.com/office/powerpoint/2010/main" val="931909458"/>
+              </p:ext>
+            </p:extLst>
+          </p:nvPr>
+        </p:nvGraphicFramePr>
+        <p:xfrm>
+          <a:off x="1154954" y="2585084"/>
+          <a:ext cx="8824911" cy="3535680"/>
+        </p:xfrm>
+        <a:graphic>
+          <a:graphicData uri="http://schemas.openxmlformats.org/drawingml/2006/table">
+            <a:tbl>
+              <a:tblPr firstRow="1" bandRow="1">
+                <a:tableStyleId>{5C22544A-7EE6-4342-B048-85BDC9FD1C3A}</a:tableStyleId>
+              </a:tblPr>
+              <a:tblGrid>
+                <a:gridCol w="2941637">
+                  <a:extLst>
+                    <a:ext uri="{9D8B030D-6E8A-4147-A177-3AD203B41FA5}">
+                      <a16:colId xmlns:a16="http://schemas.microsoft.com/office/drawing/2014/main" val="854301716"/>
+                    </a:ext>
+                  </a:extLst>
+                </a:gridCol>
+                <a:gridCol w="2941637">
+                  <a:extLst>
+                    <a:ext uri="{9D8B030D-6E8A-4147-A177-3AD203B41FA5}">
+                      <a16:colId xmlns:a16="http://schemas.microsoft.com/office/drawing/2014/main" val="1735552635"/>
+                    </a:ext>
+                  </a:extLst>
+                </a:gridCol>
+                <a:gridCol w="2941637">
+                  <a:extLst>
+                    <a:ext uri="{9D8B030D-6E8A-4147-A177-3AD203B41FA5}">
+                      <a16:colId xmlns:a16="http://schemas.microsoft.com/office/drawing/2014/main" val="1489451564"/>
+                    </a:ext>
+                  </a:extLst>
+                </a:gridCol>
+              </a:tblGrid>
+              <a:tr h="3280832">
+                <a:tc>
+                  <a:txBody>
+                    <a:bodyPr/>
+                    <a:lstStyle/>
+                    <a:p>
+                      <a:pPr algn="ctr"/>
+                      <a:endParaRPr lang="it-IT" dirty="0"/>
+                    </a:p>
+                  </a:txBody>
+                  <a:tcPr/>
+                </a:tc>
+                <a:tc>
+                  <a:txBody>
+                    <a:bodyPr/>
+                    <a:lstStyle/>
+                    <a:p>
+                      <a:pPr marL="0" marR="0" lvl="0" indent="0" algn="ctr" defTabSz="457200" rtl="0" eaLnBrk="1" fontAlgn="auto" latinLnBrk="0" hangingPunct="1">
+                        <a:lnSpc>
+                          <a:spcPct val="100000"/>
+                        </a:lnSpc>
+                        <a:spcBef>
+                          <a:spcPts val="0"/>
+                        </a:spcBef>
+                        <a:spcAft>
+                          <a:spcPts val="0"/>
+                        </a:spcAft>
+                        <a:buClrTx/>
+                        <a:buSzTx/>
+                        <a:buFontTx/>
+                        <a:buNone/>
+                        <a:tabLst/>
+                        <a:defRPr/>
+                      </a:pPr>
+                      <a:r>
+                        <a:rPr lang="en-US" sz="2400" b="0" i="0" kern="1200" dirty="0">
+                          <a:solidFill>
+                            <a:schemeClr val="bg2"/>
+                          </a:solidFill>
+                          <a:latin typeface="+mj-lt"/>
+                          <a:ea typeface="+mj-ea"/>
+                          <a:cs typeface="+mj-cs"/>
+                        </a:rPr>
+                        <a:t>RICH IN COMPONENTS</a:t>
+                      </a:r>
+                    </a:p>
+                    <a:p>
+                      <a:pPr marL="0" marR="0" lvl="0" indent="0" algn="ctr" defTabSz="457200" rtl="0" eaLnBrk="1" fontAlgn="auto" latinLnBrk="0" hangingPunct="1">
+                        <a:lnSpc>
+                          <a:spcPct val="100000"/>
+                        </a:lnSpc>
+                        <a:spcBef>
+                          <a:spcPts val="0"/>
+                        </a:spcBef>
+                        <a:spcAft>
+                          <a:spcPts val="0"/>
+                        </a:spcAft>
+                        <a:buClrTx/>
+                        <a:buSzTx/>
+                        <a:buFontTx/>
+                        <a:buNone/>
+                        <a:tabLst/>
+                        <a:defRPr/>
+                      </a:pPr>
+                      <a:endParaRPr lang="en-US" sz="2400" b="0" i="0" kern="1200" dirty="0">
+                        <a:solidFill>
+                          <a:schemeClr val="bg2"/>
+                        </a:solidFill>
+                        <a:latin typeface="+mj-lt"/>
+                        <a:ea typeface="+mj-ea"/>
+                        <a:cs typeface="+mj-cs"/>
+                      </a:endParaRPr>
+                    </a:p>
+                    <a:p>
+                      <a:pPr marL="0" marR="0" lvl="0" indent="0" algn="ctr" defTabSz="457200" rtl="0" eaLnBrk="1" fontAlgn="auto" latinLnBrk="0" hangingPunct="1">
+                        <a:lnSpc>
+                          <a:spcPct val="100000"/>
+                        </a:lnSpc>
+                        <a:spcBef>
+                          <a:spcPts val="0"/>
+                        </a:spcBef>
+                        <a:spcAft>
+                          <a:spcPts val="0"/>
+                        </a:spcAft>
+                        <a:buClrTx/>
+                        <a:buSzTx/>
+                        <a:buFontTx/>
+                        <a:buNone/>
+                        <a:tabLst/>
+                        <a:defRPr/>
+                      </a:pPr>
+                      <a:r>
+                        <a:rPr kumimoji="0" lang="en-US" sz="1600" b="0" i="0" u="none" strike="noStrike" kern="1200" cap="none" spc="0" normalizeH="0" baseline="0" noProof="0" dirty="0">
+                          <a:ln>
+                            <a:noFill/>
+                          </a:ln>
+                          <a:solidFill>
+                            <a:srgbClr val="EBEBEB"/>
+                          </a:solidFill>
+                          <a:effectLst/>
+                          <a:uLnTx/>
+                          <a:uFillTx/>
+                          <a:latin typeface="+mn-lt"/>
+                          <a:ea typeface="+mn-ea"/>
+                          <a:cs typeface="+mn-cs"/>
+                        </a:rPr>
+                        <a:t>Flutter has a lot of UI components that come together with the framework, without the need for installing a lot of external libraries to design interfaces.</a:t>
+                      </a:r>
+                    </a:p>
+                    <a:p>
+                      <a:pPr marL="0" marR="0" lvl="0" indent="0" algn="ctr" defTabSz="457200" rtl="0" eaLnBrk="1" fontAlgn="auto" latinLnBrk="0" hangingPunct="1">
+                        <a:lnSpc>
+                          <a:spcPct val="100000"/>
+                        </a:lnSpc>
+                        <a:spcBef>
+                          <a:spcPts val="0"/>
+                        </a:spcBef>
+                        <a:spcAft>
+                          <a:spcPts val="0"/>
+                        </a:spcAft>
+                        <a:buClrTx/>
+                        <a:buSzTx/>
+                        <a:buFontTx/>
+                        <a:buNone/>
+                        <a:tabLst/>
+                        <a:defRPr/>
+                      </a:pPr>
+                      <a:endParaRPr lang="en-US" sz="2400" b="0" i="0" kern="1200" dirty="0">
+                        <a:solidFill>
+                          <a:schemeClr val="bg2"/>
+                        </a:solidFill>
+                        <a:latin typeface="+mj-lt"/>
+                        <a:ea typeface="+mj-ea"/>
+                        <a:cs typeface="+mj-cs"/>
+                      </a:endParaRPr>
+                    </a:p>
+                    <a:p>
+                      <a:pPr algn="ctr"/>
+                      <a:endParaRPr lang="it-IT" dirty="0"/>
+                    </a:p>
+                  </a:txBody>
+                  <a:tcPr/>
+                </a:tc>
+                <a:tc>
+                  <a:txBody>
+                    <a:bodyPr/>
+                    <a:lstStyle/>
+                    <a:p>
+                      <a:pPr marL="0" marR="0" lvl="0" indent="0" algn="ctr" defTabSz="457200" rtl="0" eaLnBrk="1" fontAlgn="auto" latinLnBrk="0" hangingPunct="1">
+                        <a:lnSpc>
+                          <a:spcPct val="100000"/>
+                        </a:lnSpc>
+                        <a:spcBef>
+                          <a:spcPts val="0"/>
+                        </a:spcBef>
+                        <a:spcAft>
+                          <a:spcPts val="0"/>
+                        </a:spcAft>
+                        <a:buClrTx/>
+                        <a:buSzTx/>
+                        <a:buFontTx/>
+                        <a:buNone/>
+                        <a:tabLst/>
+                        <a:defRPr/>
+                      </a:pPr>
+                      <a:r>
+                        <a:rPr lang="en-US" sz="2400" b="0" i="0" kern="1200" dirty="0">
+                          <a:solidFill>
+                            <a:schemeClr val="bg2"/>
+                          </a:solidFill>
+                          <a:latin typeface="+mj-lt"/>
+                          <a:ea typeface="+mj-ea"/>
+                          <a:cs typeface="+mj-cs"/>
+                        </a:rPr>
+                        <a:t>HIGH PERFORMANCE</a:t>
+                      </a:r>
+                    </a:p>
+                    <a:p>
+                      <a:pPr algn="ctr"/>
+                      <a:endParaRPr lang="it-IT" dirty="0"/>
+                    </a:p>
+                    <a:p>
+                      <a:pPr algn="ctr"/>
+                      <a:r>
+                        <a:rPr kumimoji="0" lang="en-US" sz="1600" b="0" i="0" u="none" strike="noStrike" kern="1200" cap="none" spc="0" normalizeH="0" baseline="0" dirty="0">
+                          <a:ln>
+                            <a:noFill/>
+                          </a:ln>
+                          <a:solidFill>
+                            <a:srgbClr val="EBEBEB"/>
+                          </a:solidFill>
+                          <a:effectLst/>
+                          <a:uLnTx/>
+                          <a:uFillTx/>
+                          <a:latin typeface="+mn-lt"/>
+                          <a:ea typeface="+mn-ea"/>
+                          <a:cs typeface="+mn-cs"/>
+                        </a:rPr>
+                        <a:t>Flutter has very high performances thanks to how it works under the hood. It never uses web views or bridge to render the UI elements, but it uses his rendering engine, which is built mostly in C++.</a:t>
+                      </a:r>
+                    </a:p>
+                    <a:p>
+                      <a:pPr algn="ctr"/>
+                      <a:endParaRPr lang="it-IT" dirty="0"/>
+                    </a:p>
+                  </a:txBody>
+                  <a:tcPr/>
+                </a:tc>
+                <a:extLst>
+                  <a:ext uri="{0D108BD9-81ED-4DB2-BD59-A6C34878D82A}">
+                    <a16:rowId xmlns:a16="http://schemas.microsoft.com/office/drawing/2014/main" val="1939544003"/>
+                  </a:ext>
+                </a:extLst>
+              </a:tr>
+            </a:tbl>
+          </a:graphicData>
+        </a:graphic>
+      </p:graphicFrame>
       <p:sp>
         <p:nvSpPr>
-          <p:cNvPr id="3" name="Content Placeholder 2">
+          <p:cNvPr id="11" name="TextBox 10">
             <a:extLst>
               <a:ext uri="{FF2B5EF4-FFF2-40B4-BE49-F238E27FC236}">
-                <a16:creationId xmlns:a16="http://schemas.microsoft.com/office/drawing/2014/main" id="{7B08C715-E153-4E79-85AB-5A4905537500}"/>
+                <a16:creationId xmlns:a16="http://schemas.microsoft.com/office/drawing/2014/main" id="{6715C11D-0F77-462E-945C-A63575F2304C}"/>
+              </a:ext>
+            </a:extLst>
+          </p:cNvPr>
+          <p:cNvSpPr txBox="1"/>
+          <p:nvPr/>
+        </p:nvSpPr>
+        <p:spPr>
+          <a:xfrm>
+            <a:off x="1249960" y="2662370"/>
+            <a:ext cx="2817056" cy="3072636"/>
+          </a:xfrm>
+          <a:prstGeom prst="rect">
+            <a:avLst/>
+          </a:prstGeom>
+        </p:spPr>
+        <p:txBody>
+          <a:bodyPr wrap="square" lIns="0" tIns="0" rIns="0" bIns="0" rtlCol="0" anchor="t">
+            <a:spAutoFit/>
+          </a:bodyPr>
+          <a:lstStyle>
+            <a:defPPr>
+              <a:defRPr lang="en-US"/>
+            </a:defPPr>
+            <a:lvl1pPr marL="0" algn="l" defTabSz="914400" rtl="0" eaLnBrk="1" latinLnBrk="0" hangingPunct="1">
+              <a:defRPr sz="1800" kern="1200">
+                <a:solidFill>
+                  <a:schemeClr val="tx1"/>
+                </a:solidFill>
+                <a:latin typeface="+mn-lt"/>
+                <a:ea typeface="+mn-ea"/>
+                <a:cs typeface="+mn-cs"/>
+              </a:defRPr>
+            </a:lvl1pPr>
+            <a:lvl2pPr marL="457200" algn="l" defTabSz="914400" rtl="0" eaLnBrk="1" latinLnBrk="0" hangingPunct="1">
+              <a:defRPr sz="1800" kern="1200">
+                <a:solidFill>
+                  <a:schemeClr val="tx1"/>
+                </a:solidFill>
+                <a:latin typeface="+mn-lt"/>
+                <a:ea typeface="+mn-ea"/>
+                <a:cs typeface="+mn-cs"/>
+              </a:defRPr>
+            </a:lvl2pPr>
+            <a:lvl3pPr marL="914400" algn="l" defTabSz="914400" rtl="0" eaLnBrk="1" latinLnBrk="0" hangingPunct="1">
+              <a:defRPr sz="1800" kern="1200">
+                <a:solidFill>
+                  <a:schemeClr val="tx1"/>
+                </a:solidFill>
+                <a:latin typeface="+mn-lt"/>
+                <a:ea typeface="+mn-ea"/>
+                <a:cs typeface="+mn-cs"/>
+              </a:defRPr>
+            </a:lvl3pPr>
+            <a:lvl4pPr marL="1371600" algn="l" defTabSz="914400" rtl="0" eaLnBrk="1" latinLnBrk="0" hangingPunct="1">
+              <a:defRPr sz="1800" kern="1200">
+                <a:solidFill>
+                  <a:schemeClr val="tx1"/>
+                </a:solidFill>
+                <a:latin typeface="+mn-lt"/>
+                <a:ea typeface="+mn-ea"/>
+                <a:cs typeface="+mn-cs"/>
+              </a:defRPr>
+            </a:lvl4pPr>
+            <a:lvl5pPr marL="1828800" algn="l" defTabSz="914400" rtl="0" eaLnBrk="1" latinLnBrk="0" hangingPunct="1">
+              <a:defRPr sz="1800" kern="1200">
+                <a:solidFill>
+                  <a:schemeClr val="tx1"/>
+                </a:solidFill>
+                <a:latin typeface="+mn-lt"/>
+                <a:ea typeface="+mn-ea"/>
+                <a:cs typeface="+mn-cs"/>
+              </a:defRPr>
+            </a:lvl5pPr>
+            <a:lvl6pPr marL="2286000" algn="l" defTabSz="914400" rtl="0" eaLnBrk="1" latinLnBrk="0" hangingPunct="1">
+              <a:defRPr sz="1800" kern="1200">
+                <a:solidFill>
+                  <a:schemeClr val="tx1"/>
+                </a:solidFill>
+                <a:latin typeface="+mn-lt"/>
+                <a:ea typeface="+mn-ea"/>
+                <a:cs typeface="+mn-cs"/>
+              </a:defRPr>
+            </a:lvl6pPr>
+            <a:lvl7pPr marL="2743200" algn="l" defTabSz="914400" rtl="0" eaLnBrk="1" latinLnBrk="0" hangingPunct="1">
+              <a:defRPr sz="1800" kern="1200">
+                <a:solidFill>
+                  <a:schemeClr val="tx1"/>
+                </a:solidFill>
+                <a:latin typeface="+mn-lt"/>
+                <a:ea typeface="+mn-ea"/>
+                <a:cs typeface="+mn-cs"/>
+              </a:defRPr>
+            </a:lvl7pPr>
+            <a:lvl8pPr marL="3200400" algn="l" defTabSz="914400" rtl="0" eaLnBrk="1" latinLnBrk="0" hangingPunct="1">
+              <a:defRPr sz="1800" kern="1200">
+                <a:solidFill>
+                  <a:schemeClr val="tx1"/>
+                </a:solidFill>
+                <a:latin typeface="+mn-lt"/>
+                <a:ea typeface="+mn-ea"/>
+                <a:cs typeface="+mn-cs"/>
+              </a:defRPr>
+            </a:lvl8pPr>
+            <a:lvl9pPr marL="3657600" algn="l" defTabSz="914400" rtl="0" eaLnBrk="1" latinLnBrk="0" hangingPunct="1">
+              <a:defRPr sz="1800" kern="1200">
+                <a:solidFill>
+                  <a:schemeClr val="tx1"/>
+                </a:solidFill>
+                <a:latin typeface="+mn-lt"/>
+                <a:ea typeface="+mn-ea"/>
+                <a:cs typeface="+mn-cs"/>
+              </a:defRPr>
+            </a:lvl9pPr>
+          </a:lstStyle>
+          <a:p>
+            <a:pPr algn="ctr">
+              <a:lnSpc>
+                <a:spcPts val="4284"/>
+              </a:lnSpc>
+            </a:pPr>
+            <a:r>
+              <a:rPr lang="en-US" sz="2400" dirty="0">
+                <a:solidFill>
+                  <a:schemeClr val="bg2"/>
+                </a:solidFill>
+                <a:latin typeface="+mj-lt"/>
+                <a:ea typeface="+mj-ea"/>
+                <a:cs typeface="+mj-cs"/>
+              </a:rPr>
+              <a:t>PORTABILITY</a:t>
+            </a:r>
+          </a:p>
+          <a:p>
+            <a:pPr algn="ctr">
+              <a:lnSpc>
+                <a:spcPts val="4284"/>
+              </a:lnSpc>
+            </a:pPr>
+            <a:endParaRPr lang="en-US" sz="2400" dirty="0">
+              <a:solidFill>
+                <a:schemeClr val="bg2"/>
+              </a:solidFill>
+              <a:latin typeface="+mj-lt"/>
+              <a:ea typeface="+mj-ea"/>
+              <a:cs typeface="+mj-cs"/>
+            </a:endParaRPr>
+          </a:p>
+          <a:p>
+            <a:pPr algn="ctr" defTabSz="457200"/>
+            <a:r>
+              <a:rPr lang="en-US" sz="1600" dirty="0">
+                <a:solidFill>
+                  <a:srgbClr val="EBEBEB"/>
+                </a:solidFill>
+              </a:rPr>
+              <a:t>With a single code base is possible to create a product that would fit both iOS and Android devices. Furthermore, it is possible to use it to create web and desktop apps (still under testing)</a:t>
+            </a:r>
+            <a:endParaRPr lang="en-US" sz="3600" dirty="0">
+              <a:solidFill>
+                <a:schemeClr val="bg2"/>
+              </a:solidFill>
+              <a:latin typeface="+mj-lt"/>
+              <a:ea typeface="+mj-ea"/>
+              <a:cs typeface="+mj-cs"/>
+            </a:endParaRPr>
+          </a:p>
+        </p:txBody>
+      </p:sp>
+      <p:pic>
+        <p:nvPicPr>
+          <p:cNvPr id="27" name="Picture 2" descr="Easy Flutter essentials for beginners #1 - Stratton Apps">
+            <a:extLst>
+              <a:ext uri="{FF2B5EF4-FFF2-40B4-BE49-F238E27FC236}">
+                <a16:creationId xmlns:a16="http://schemas.microsoft.com/office/drawing/2014/main" id="{6364E16C-887C-45BE-BC8A-313908AA7F00}"/>
+              </a:ext>
+            </a:extLst>
+          </p:cNvPr>
+          <p:cNvPicPr>
+            <a:picLocks noChangeAspect="1" noChangeArrowheads="1"/>
+          </p:cNvPicPr>
+          <p:nvPr/>
+        </p:nvPicPr>
+        <p:blipFill>
+          <a:blip r:embed="rId2">
+            <a:extLst>
+              <a:ext uri="{28A0092B-C50C-407E-A947-70E740481C1C}">
+                <a14:useLocalDpi xmlns:a14="http://schemas.microsoft.com/office/drawing/2010/main" val="0"/>
+              </a:ext>
+            </a:extLst>
+          </a:blip>
+          <a:srcRect/>
+          <a:stretch>
+            <a:fillRect/>
+          </a:stretch>
+        </p:blipFill>
+        <p:spPr bwMode="auto">
+          <a:xfrm>
+            <a:off x="4282405" y="864463"/>
+            <a:ext cx="746468" cy="925373"/>
+          </a:xfrm>
+          <a:prstGeom prst="rect">
+            <a:avLst/>
+          </a:prstGeom>
+          <a:noFill/>
+          <a:extLst>
+            <a:ext uri="{909E8E84-426E-40DD-AFC4-6F175D3DCCD1}">
+              <a14:hiddenFill xmlns:a14="http://schemas.microsoft.com/office/drawing/2010/main">
+                <a:solidFill>
+                  <a:srgbClr val="FFFFFF"/>
+                </a:solidFill>
+              </a14:hiddenFill>
+            </a:ext>
+          </a:extLst>
+        </p:spPr>
+      </p:pic>
+    </p:spTree>
+    <p:extLst>
+      <p:ext uri="{BB962C8B-B14F-4D97-AF65-F5344CB8AC3E}">
+        <p14:creationId xmlns:p14="http://schemas.microsoft.com/office/powerpoint/2010/main" val="117062142"/>
+      </p:ext>
+    </p:extLst>
+  </p:cSld>
+  <p:clrMapOvr>
+    <a:masterClrMapping/>
+  </p:clrMapOvr>
+</p:sld>
+</file>
+
+<file path=ppt/slides/slide9.xml><?xml version="1.0" encoding="utf-8"?>
+<p:sld xmlns:a="http://schemas.openxmlformats.org/drawingml/2006/main" xmlns:r="http://schemas.openxmlformats.org/officeDocument/2006/relationships" xmlns:p="http://schemas.openxmlformats.org/presentationml/2006/main">
+  <p:cSld>
+    <p:spTree>
+      <p:nvGrpSpPr>
+        <p:cNvPr id="1" name=""/>
+        <p:cNvGrpSpPr/>
+        <p:nvPr/>
+      </p:nvGrpSpPr>
+      <p:grpSpPr>
+        <a:xfrm>
+          <a:off x="0" y="0"/>
+          <a:ext cx="0" cy="0"/>
+          <a:chOff x="0" y="0"/>
+          <a:chExt cx="0" cy="0"/>
+        </a:xfrm>
+      </p:grpSpPr>
+      <p:sp>
+        <p:nvSpPr>
+          <p:cNvPr id="2" name="Title 1">
+            <a:extLst>
+              <a:ext uri="{FF2B5EF4-FFF2-40B4-BE49-F238E27FC236}">
+                <a16:creationId xmlns:a16="http://schemas.microsoft.com/office/drawing/2014/main" id="{A7448847-A966-469F-AF1E-11ACE7C99CD6}"/>
+              </a:ext>
+            </a:extLst>
+          </p:cNvPr>
+          <p:cNvSpPr>
+            <a:spLocks noGrp="1"/>
+          </p:cNvSpPr>
+          <p:nvPr>
+            <p:ph type="title"/>
+          </p:nvPr>
+        </p:nvSpPr>
+        <p:spPr/>
+        <p:txBody>
+          <a:bodyPr/>
+          <a:lstStyle/>
+          <a:p>
+            <a:r>
+              <a:rPr lang="it-IT" dirty="0" err="1"/>
+              <a:t>Why</a:t>
+            </a:r>
+            <a:r>
+              <a:rPr lang="it-IT" dirty="0"/>
+              <a:t> </a:t>
+            </a:r>
+            <a:r>
+              <a:rPr lang="it-IT" dirty="0" err="1"/>
+              <a:t>Firebase</a:t>
+            </a:r>
+            <a:r>
+              <a:rPr lang="it-IT" dirty="0"/>
+              <a:t>?</a:t>
+            </a:r>
+          </a:p>
+        </p:txBody>
+      </p:sp>
+      <p:pic>
+        <p:nvPicPr>
+          <p:cNvPr id="6" name="Picture 8" descr="The Firebase Blog: Firebase expands to become a unified app platform">
+            <a:extLst>
+              <a:ext uri="{FF2B5EF4-FFF2-40B4-BE49-F238E27FC236}">
+                <a16:creationId xmlns:a16="http://schemas.microsoft.com/office/drawing/2014/main" id="{C2A957DF-2FE3-4755-BC6F-BB5F05D14605}"/>
+              </a:ext>
+            </a:extLst>
+          </p:cNvPr>
+          <p:cNvPicPr>
+            <a:picLocks noChangeAspect="1" noChangeArrowheads="1"/>
+          </p:cNvPicPr>
+          <p:nvPr/>
+        </p:nvPicPr>
+        <p:blipFill rotWithShape="1">
+          <a:blip r:embed="rId2">
+            <a:extLst>
+              <a:ext uri="{28A0092B-C50C-407E-A947-70E740481C1C}">
+                <a14:useLocalDpi xmlns:a14="http://schemas.microsoft.com/office/drawing/2010/main" val="0"/>
+              </a:ext>
+            </a:extLst>
+          </a:blip>
+          <a:srcRect l="9080" t="22784" r="65919" b="23793"/>
+          <a:stretch/>
+        </p:blipFill>
+        <p:spPr bwMode="auto">
+          <a:xfrm>
+            <a:off x="4559740" y="798916"/>
+            <a:ext cx="964735" cy="1056468"/>
+          </a:xfrm>
+          <a:prstGeom prst="rect">
+            <a:avLst/>
+          </a:prstGeom>
+          <a:noFill/>
+          <a:extLst>
+            <a:ext uri="{909E8E84-426E-40DD-AFC4-6F175D3DCCD1}">
+              <a14:hiddenFill xmlns:a14="http://schemas.microsoft.com/office/drawing/2010/main">
+                <a:solidFill>
+                  <a:srgbClr val="FFFFFF"/>
+                </a:solidFill>
+              </a14:hiddenFill>
+            </a:ext>
+          </a:extLst>
+        </p:spPr>
+      </p:pic>
+      <p:sp>
+        <p:nvSpPr>
+          <p:cNvPr id="4" name="Content Placeholder 3">
+            <a:extLst>
+              <a:ext uri="{FF2B5EF4-FFF2-40B4-BE49-F238E27FC236}">
+                <a16:creationId xmlns:a16="http://schemas.microsoft.com/office/drawing/2014/main" id="{14DB01F9-E386-466A-AF4F-98ADAE76B4C9}"/>
               </a:ext>
             </a:extLst>
           </p:cNvPr>
@@ -14857,21 +16268,132 @@
         </p:nvSpPr>
         <p:spPr/>
         <p:txBody>
-          <a:bodyPr>
-            <a:normAutofit/>
-          </a:bodyPr>
+          <a:bodyPr/>
           <a:lstStyle/>
           <a:p>
-            <a:pPr marL="0" indent="0">
-              <a:buNone/>
-            </a:pPr>
-            <a:r>
-              <a:rPr lang="it-IT" sz="6000" dirty="0" err="1"/>
-              <a:t>It’s</a:t>
-            </a:r>
-            <a:r>
-              <a:rPr lang="it-IT" sz="6000" dirty="0"/>
-              <a:t> demo time</a:t>
+            <a:r>
+              <a:rPr lang="it-IT" dirty="0"/>
+              <a:t>Cross-</a:t>
+            </a:r>
+            <a:r>
+              <a:rPr lang="it-IT" dirty="0" err="1"/>
+              <a:t>platform</a:t>
+            </a:r>
+            <a:r>
+              <a:rPr lang="it-IT" dirty="0"/>
+              <a:t> </a:t>
+            </a:r>
+            <a:r>
+              <a:rPr lang="it-IT" dirty="0" err="1"/>
+              <a:t>solution</a:t>
+            </a:r>
+            <a:r>
+              <a:rPr lang="it-IT" dirty="0"/>
+              <a:t> </a:t>
+            </a:r>
+            <a:r>
+              <a:rPr lang="it-IT" dirty="0" err="1"/>
+              <a:t>that</a:t>
+            </a:r>
+            <a:r>
+              <a:rPr lang="it-IT" dirty="0"/>
+              <a:t> </a:t>
+            </a:r>
+            <a:r>
+              <a:rPr lang="it-IT" dirty="0" err="1"/>
+              <a:t>offers</a:t>
+            </a:r>
+            <a:r>
+              <a:rPr lang="it-IT" dirty="0"/>
+              <a:t> a </a:t>
+            </a:r>
+            <a:r>
+              <a:rPr lang="it-IT" dirty="0" err="1"/>
+              <a:t>variety</a:t>
+            </a:r>
+            <a:r>
+              <a:rPr lang="it-IT" dirty="0"/>
+              <a:t> of </a:t>
+            </a:r>
+            <a:r>
+              <a:rPr lang="it-IT" dirty="0" err="1"/>
+              <a:t>useful</a:t>
+            </a:r>
+            <a:r>
+              <a:rPr lang="it-IT" dirty="0"/>
+              <a:t> services </a:t>
+            </a:r>
+          </a:p>
+          <a:p>
+            <a:pPr lvl="1"/>
+            <a:r>
+              <a:rPr lang="en-US" sz="1800" b="1" dirty="0"/>
+              <a:t>FCM</a:t>
+            </a:r>
+            <a:r>
+              <a:rPr lang="en-US" sz="1800" dirty="0"/>
+              <a:t> (Firebase Cloud Messaging): provides a reliable connection between your server and devices that allows to deliver and receive messages and notifications on iOS, Android, and the web</a:t>
+            </a:r>
+          </a:p>
+          <a:p>
+            <a:pPr lvl="2"/>
+            <a:r>
+              <a:rPr lang="en-US" sz="1600" dirty="0"/>
+              <a:t>Used to send </a:t>
+            </a:r>
+            <a:r>
+              <a:rPr lang="en-US" sz="1600" b="1" dirty="0"/>
+              <a:t>push notifications</a:t>
+            </a:r>
+            <a:r>
+              <a:rPr lang="en-US" sz="1600" dirty="0"/>
+              <a:t> to the mobile app</a:t>
+            </a:r>
+          </a:p>
+          <a:p>
+            <a:pPr lvl="1"/>
+            <a:r>
+              <a:rPr lang="en-US" sz="1800" b="1" dirty="0"/>
+              <a:t>FCS</a:t>
+            </a:r>
+            <a:r>
+              <a:rPr lang="en-US" sz="1800" dirty="0"/>
+              <a:t> (Firebase Cloud Storage): store and serve user-generated content, such as photos, audio, video on a high scalable and secure platform</a:t>
+            </a:r>
+          </a:p>
+          <a:p>
+            <a:pPr lvl="2"/>
+            <a:r>
+              <a:rPr lang="it-IT" sz="1600" dirty="0" err="1"/>
+              <a:t>Used</a:t>
+            </a:r>
+            <a:r>
+              <a:rPr lang="it-IT" sz="1600" dirty="0"/>
+              <a:t> to upload and </a:t>
+            </a:r>
+            <a:r>
+              <a:rPr lang="it-IT" sz="1600" dirty="0" err="1"/>
+              <a:t>manage</a:t>
+            </a:r>
+            <a:r>
+              <a:rPr lang="it-IT" sz="1600" dirty="0"/>
+              <a:t> </a:t>
+            </a:r>
+            <a:r>
+              <a:rPr lang="it-IT" sz="1600" dirty="0" err="1"/>
+              <a:t>profile</a:t>
+            </a:r>
+            <a:r>
+              <a:rPr lang="it-IT" sz="1600" dirty="0"/>
+              <a:t> image of </a:t>
+            </a:r>
+            <a:r>
+              <a:rPr lang="it-IT" sz="1600" dirty="0" err="1"/>
+              <a:t>caregiver</a:t>
+            </a:r>
+            <a:r>
+              <a:rPr lang="it-IT" sz="1600" dirty="0"/>
+              <a:t> users</a:t>
             </a:r>
           </a:p>
         </p:txBody>
@@ -14879,7 +16401,7 @@
     </p:spTree>
     <p:extLst>
       <p:ext uri="{BB962C8B-B14F-4D97-AF65-F5344CB8AC3E}">
-        <p14:creationId xmlns:p14="http://schemas.microsoft.com/office/powerpoint/2010/main" val="2665333462"/>
+        <p14:creationId xmlns:p14="http://schemas.microsoft.com/office/powerpoint/2010/main" val="555576095"/>
       </p:ext>
     </p:extLst>
   </p:cSld>

</xml_diff>

<commit_message>
Updated presentation (DD to be pushed)
</commit_message>
<xml_diff>
--- a/documentation/Baddy_presentation.pptx
+++ b/documentation/Baddy_presentation.pptx
@@ -463,7 +463,7 @@
             <a:fld id="{5923F103-BC34-4FE4-A40E-EDDEECFDA5D0}" type="datetimeFigureOut">
               <a:rPr lang="en-US" dirty="0"/>
               <a:pPr/>
-              <a:t>1/28/2021</a:t>
+              <a:t>1/29/2021</a:t>
             </a:fld>
             <a:endParaRPr lang="en-US" dirty="0"/>
           </a:p>
@@ -1547,7 +1547,7 @@
           <a:p>
             <a:fld id="{923A1CC3-2375-41D4-9E03-427CAF2A4C1A}" type="datetimeFigureOut">
               <a:rPr lang="en-US" dirty="0"/>
-              <a:t>1/28/2021</a:t>
+              <a:t>1/29/2021</a:t>
             </a:fld>
             <a:endParaRPr lang="en-US" dirty="0"/>
           </a:p>
@@ -2523,7 +2523,7 @@
           <a:p>
             <a:fld id="{AFF16868-8199-4C2C-A5B1-63AEE139F88E}" type="datetimeFigureOut">
               <a:rPr lang="en-US" dirty="0"/>
-              <a:t>1/28/2021</a:t>
+              <a:t>1/29/2021</a:t>
             </a:fld>
             <a:endParaRPr lang="en-US" dirty="0"/>
           </a:p>
@@ -3653,7 +3653,7 @@
           <a:p>
             <a:fld id="{AAD9FF7F-6988-44CC-821B-644E70CD2F73}" type="datetimeFigureOut">
               <a:rPr lang="en-US" dirty="0"/>
-              <a:t>1/28/2021</a:t>
+              <a:t>1/29/2021</a:t>
             </a:fld>
             <a:endParaRPr lang="en-US" dirty="0"/>
           </a:p>
@@ -4682,7 +4682,7 @@
           <a:p>
             <a:fld id="{5C12C299-16B2-4475-990D-751901EACC14}" type="datetimeFigureOut">
               <a:rPr lang="en-US" dirty="0"/>
-              <a:t>1/28/2021</a:t>
+              <a:t>1/29/2021</a:t>
             </a:fld>
             <a:endParaRPr lang="en-US" dirty="0"/>
           </a:p>
@@ -5338,7 +5338,7 @@
           <a:p>
             <a:fld id="{9FE86839-B9D8-4651-8783-F325ECE74E65}" type="datetimeFigureOut">
               <a:rPr lang="en-US" dirty="0"/>
-              <a:t>1/28/2021</a:t>
+              <a:t>1/29/2021</a:t>
             </a:fld>
             <a:endParaRPr lang="en-US" dirty="0"/>
           </a:p>
@@ -6195,7 +6195,7 @@
           <a:p>
             <a:fld id="{FD484F64-32F6-45C5-931F-ADC1662401D0}" type="datetimeFigureOut">
               <a:rPr lang="en-US" dirty="0"/>
-              <a:t>1/28/2021</a:t>
+              <a:t>1/29/2021</a:t>
             </a:fld>
             <a:endParaRPr lang="en-US" dirty="0"/>
           </a:p>
@@ -6381,7 +6381,7 @@
           <a:p>
             <a:fld id="{53086D93-FCAC-47E0-A2EE-787E62CA814C}" type="datetimeFigureOut">
               <a:rPr lang="en-US" dirty="0"/>
-              <a:t>1/28/2021</a:t>
+              <a:t>1/29/2021</a:t>
             </a:fld>
             <a:endParaRPr lang="en-US" dirty="0"/>
           </a:p>
@@ -7349,7 +7349,7 @@
           <a:p>
             <a:fld id="{CDA879A6-0FD0-4734-A311-86BFCA472E6E}" type="datetimeFigureOut">
               <a:rPr lang="en-US" dirty="0"/>
-              <a:t>1/28/2021</a:t>
+              <a:t>1/29/2021</a:t>
             </a:fld>
             <a:endParaRPr lang="en-US" dirty="0"/>
           </a:p>
@@ -7556,7 +7556,7 @@
           <a:p>
             <a:fld id="{19C9CA7B-DFD4-44B5-8C60-D14B8CD1FB59}" type="datetimeFigureOut">
               <a:rPr lang="en-US" dirty="0"/>
-              <a:t>1/28/2021</a:t>
+              <a:t>1/29/2021</a:t>
             </a:fld>
             <a:endParaRPr lang="en-US" dirty="0"/>
           </a:p>
@@ -8586,7 +8586,7 @@
           <a:p>
             <a:fld id="{F34E6425-0181-43F2-84FC-787E803FD2F8}" type="datetimeFigureOut">
               <a:rPr lang="en-US" dirty="0"/>
-              <a:t>1/28/2021</a:t>
+              <a:t>1/29/2021</a:t>
             </a:fld>
             <a:endParaRPr lang="en-US" dirty="0"/>
           </a:p>
@@ -8854,7 +8854,7 @@
           <a:p>
             <a:fld id="{3BDB8791-F1B0-41E7-B7FD-A781E65C4266}" type="datetimeFigureOut">
               <a:rPr lang="en-US" dirty="0"/>
-              <a:t>1/28/2021</a:t>
+              <a:t>1/29/2021</a:t>
             </a:fld>
             <a:endParaRPr lang="en-US" dirty="0"/>
           </a:p>
@@ -9260,7 +9260,7 @@
           <a:p>
             <a:fld id="{5FDD63B2-E120-4ED8-B27B-C685F510A5FE}" type="datetimeFigureOut">
               <a:rPr lang="en-US" dirty="0"/>
-              <a:t>1/28/2021</a:t>
+              <a:t>1/29/2021</a:t>
             </a:fld>
             <a:endParaRPr lang="en-US" dirty="0"/>
           </a:p>
@@ -9383,7 +9383,7 @@
           <a:p>
             <a:fld id="{7AA18ACC-A947-437B-A130-35BD54FDF1E9}" type="datetimeFigureOut">
               <a:rPr lang="en-US" dirty="0"/>
-              <a:t>1/28/2021</a:t>
+              <a:t>1/29/2021</a:t>
             </a:fld>
             <a:endParaRPr lang="en-US" dirty="0"/>
           </a:p>
@@ -9474,7 +9474,7 @@
           <a:p>
             <a:fld id="{7C8D7E02-BCB8-4D50-A234-369438C08659}" type="datetimeFigureOut">
               <a:rPr lang="en-US" dirty="0"/>
-              <a:t>1/28/2021</a:t>
+              <a:t>1/29/2021</a:t>
             </a:fld>
             <a:endParaRPr lang="en-US" dirty="0"/>
           </a:p>
@@ -10551,7 +10551,7 @@
           <a:p>
             <a:fld id="{76E86A4C-8E40-4F87-A4F0-01A0687C5742}" type="datetimeFigureOut">
               <a:rPr lang="en-US" dirty="0"/>
-              <a:t>1/28/2021</a:t>
+              <a:t>1/29/2021</a:t>
             </a:fld>
             <a:endParaRPr lang="en-US" dirty="0"/>
           </a:p>
@@ -11655,7 +11655,7 @@
           <a:p>
             <a:fld id="{35E72C73-2D91-4E12-BA25-F0AA0C03599B}" type="datetimeFigureOut">
               <a:rPr lang="en-US" dirty="0"/>
-              <a:t>1/28/2021</a:t>
+              <a:t>1/29/2021</a:t>
             </a:fld>
             <a:endParaRPr lang="en-US" dirty="0"/>
           </a:p>
@@ -12648,7 +12648,7 @@
           <a:p>
             <a:fld id="{2BE451C3-0FF4-47C4-B829-773ADF60F88C}" type="datetimeFigureOut">
               <a:rPr lang="en-US" dirty="0"/>
-              <a:t>1/28/2021</a:t>
+              <a:t>1/29/2021</a:t>
             </a:fld>
             <a:endParaRPr lang="en-US" dirty="0"/>
           </a:p>
@@ -13549,8 +13549,27 @@
           <a:lstStyle/>
           <a:p>
             <a:r>
+              <a:rPr lang="en-US" dirty="0"/>
+              <a:t>The UI follows the design guidelines provided by Google’s Material Design</a:t>
+            </a:r>
+            <a:endParaRPr lang="it-IT" dirty="0"/>
+          </a:p>
+          <a:p>
+            <a:r>
+              <a:rPr lang="it-IT" dirty="0"/>
+              <a:t>REST </a:t>
+            </a:r>
+            <a:r>
               <a:rPr lang="it-IT" dirty="0" err="1"/>
-              <a:t>Because</a:t>
+              <a:t>APIs</a:t>
+            </a:r>
+            <a:r>
+              <a:rPr lang="it-IT" dirty="0"/>
+              <a:t> for </a:t>
+            </a:r>
+            <a:r>
+              <a:rPr lang="it-IT" dirty="0" err="1"/>
+              <a:t>client-server</a:t>
             </a:r>
             <a:r>
               <a:rPr lang="it-IT" dirty="0"/>
@@ -13558,12 +13577,100 @@
             </a:r>
             <a:r>
               <a:rPr lang="it-IT" dirty="0" err="1"/>
-              <a:t>it’s</a:t>
+              <a:t>communication</a:t>
             </a:r>
             <a:r>
               <a:rPr lang="it-IT" dirty="0"/>
-              <a:t> cool</a:t>
-            </a:r>
+              <a:t> (high </a:t>
+            </a:r>
+            <a:r>
+              <a:rPr lang="it-IT" dirty="0" err="1"/>
+              <a:t>level</a:t>
+            </a:r>
+            <a:r>
+              <a:rPr lang="it-IT" dirty="0"/>
+              <a:t> of decoupling)</a:t>
+            </a:r>
+          </a:p>
+          <a:p>
+            <a:r>
+              <a:rPr lang="it-IT" dirty="0"/>
+              <a:t>Multi-</a:t>
+            </a:r>
+            <a:r>
+              <a:rPr lang="it-IT" dirty="0" err="1"/>
+              <a:t>tier</a:t>
+            </a:r>
+            <a:r>
+              <a:rPr lang="it-IT" dirty="0"/>
+              <a:t> </a:t>
+            </a:r>
+            <a:r>
+              <a:rPr lang="it-IT" dirty="0" err="1"/>
+              <a:t>architecture</a:t>
+            </a:r>
+            <a:endParaRPr lang="it-IT" dirty="0"/>
+          </a:p>
+          <a:p>
+            <a:r>
+              <a:rPr lang="it-IT" dirty="0" err="1"/>
+              <a:t>Thin</a:t>
+            </a:r>
+            <a:r>
+              <a:rPr lang="it-IT" dirty="0"/>
+              <a:t> client (</a:t>
+            </a:r>
+            <a:r>
+              <a:rPr lang="it-IT" dirty="0" err="1"/>
+              <a:t>better</a:t>
+            </a:r>
+            <a:r>
+              <a:rPr lang="it-IT" dirty="0"/>
+              <a:t> </a:t>
+            </a:r>
+            <a:r>
+              <a:rPr lang="it-IT" dirty="0" err="1"/>
+              <a:t>let</a:t>
+            </a:r>
+            <a:r>
+              <a:rPr lang="it-IT" dirty="0"/>
+              <a:t> the server do the </a:t>
+            </a:r>
+            <a:r>
+              <a:rPr lang="it-IT" dirty="0" err="1"/>
+              <a:t>dirty</a:t>
+            </a:r>
+            <a:r>
+              <a:rPr lang="it-IT" dirty="0"/>
+              <a:t> work)</a:t>
+            </a:r>
+          </a:p>
+          <a:p>
+            <a:r>
+              <a:rPr lang="it-IT" dirty="0" err="1"/>
+              <a:t>HTTPs</a:t>
+            </a:r>
+            <a:r>
+              <a:rPr lang="it-IT" dirty="0"/>
+              <a:t> to </a:t>
+            </a:r>
+            <a:r>
+              <a:rPr lang="it-IT" dirty="0" err="1"/>
+              <a:t>protect</a:t>
+            </a:r>
+            <a:r>
+              <a:rPr lang="it-IT" dirty="0"/>
+              <a:t> the users’ data</a:t>
+            </a:r>
+          </a:p>
+          <a:p>
+            <a:r>
+              <a:rPr lang="it-IT" dirty="0"/>
+              <a:t>And … </a:t>
+            </a:r>
+          </a:p>
+          <a:p>
+            <a:endParaRPr lang="en-US" dirty="0"/>
           </a:p>
         </p:txBody>
       </p:sp>
@@ -13620,7 +13727,7 @@
           <a:p>
             <a:r>
               <a:rPr lang="it-IT" dirty="0"/>
-              <a:t>State management with Provider</a:t>
+              <a:t>App State management</a:t>
             </a:r>
           </a:p>
         </p:txBody>
@@ -15426,7 +15533,7 @@
         </p:blipFill>
         <p:spPr bwMode="auto">
           <a:xfrm>
-            <a:off x="1340395" y="3965587"/>
+            <a:off x="1010442" y="3910135"/>
             <a:ext cx="1427990" cy="1770234"/>
           </a:xfrm>
           <a:prstGeom prst="rect">
@@ -15473,7 +15580,7 @@
         </p:blipFill>
         <p:spPr bwMode="auto">
           <a:xfrm>
-            <a:off x="4034524" y="4144200"/>
+            <a:off x="4125390" y="4008732"/>
             <a:ext cx="3066517" cy="1875600"/>
           </a:xfrm>
           <a:prstGeom prst="rect">
@@ -15520,7 +15627,7 @@
         </p:blipFill>
         <p:spPr bwMode="auto">
           <a:xfrm>
-            <a:off x="7719850" y="3861911"/>
+            <a:off x="7905903" y="3906746"/>
             <a:ext cx="3858705" cy="1977586"/>
           </a:xfrm>
           <a:prstGeom prst="rect">
@@ -15552,7 +15659,7 @@
         </p:nvSpPr>
         <p:spPr>
           <a:xfrm>
-            <a:off x="2962663" y="4065874"/>
+            <a:off x="2862381" y="4008732"/>
             <a:ext cx="906011" cy="1569660"/>
           </a:xfrm>
           <a:prstGeom prst="rect">
@@ -15587,7 +15694,7 @@
         </p:nvSpPr>
         <p:spPr>
           <a:xfrm>
-            <a:off x="7266844" y="4065874"/>
+            <a:off x="7286175" y="4110709"/>
             <a:ext cx="906011" cy="1569660"/>
           </a:xfrm>
           <a:prstGeom prst="rect">
@@ -16397,7 +16504,15 @@
             </a:r>
             <a:r>
               <a:rPr lang="it-IT" sz="1600" dirty="0"/>
-              <a:t> to upload and </a:t>
+              <a:t> to </a:t>
+            </a:r>
+            <a:r>
+              <a:rPr lang="it-IT" sz="1600" b="1" dirty="0"/>
+              <a:t>upload</a:t>
+            </a:r>
+            <a:r>
+              <a:rPr lang="it-IT" sz="1600" dirty="0"/>
+              <a:t> and </a:t>
             </a:r>
             <a:r>
               <a:rPr lang="it-IT" sz="1600" dirty="0" err="1"/>
@@ -16408,12 +16523,16 @@
               <a:t> </a:t>
             </a:r>
             <a:r>
-              <a:rPr lang="it-IT" sz="1600" dirty="0" err="1"/>
+              <a:rPr lang="it-IT" sz="1600" b="1" dirty="0" err="1"/>
               <a:t>profile</a:t>
             </a:r>
             <a:r>
+              <a:rPr lang="it-IT" sz="1600" b="1" dirty="0"/>
+              <a:t> image </a:t>
+            </a:r>
+            <a:r>
               <a:rPr lang="it-IT" sz="1600" dirty="0"/>
-              <a:t> image of </a:t>
+              <a:t>of </a:t>
             </a:r>
             <a:r>
               <a:rPr lang="it-IT" sz="1600" dirty="0" err="1"/>

</xml_diff>

<commit_message>
updated presentation with node.js and provider
</commit_message>
<xml_diff>
--- a/documentation/Baddy_presentation.pptx
+++ b/documentation/Baddy_presentation.pptx
@@ -463,7 +463,7 @@
             <a:fld id="{5923F103-BC34-4FE4-A40E-EDDEECFDA5D0}" type="datetimeFigureOut">
               <a:rPr lang="en-US" dirty="0"/>
               <a:pPr/>
-              <a:t>1/29/2021</a:t>
+              <a:t>1/31/2021</a:t>
             </a:fld>
             <a:endParaRPr lang="en-US" dirty="0"/>
           </a:p>
@@ -1547,7 +1547,7 @@
           <a:p>
             <a:fld id="{923A1CC3-2375-41D4-9E03-427CAF2A4C1A}" type="datetimeFigureOut">
               <a:rPr lang="en-US" dirty="0"/>
-              <a:t>1/29/2021</a:t>
+              <a:t>1/31/2021</a:t>
             </a:fld>
             <a:endParaRPr lang="en-US" dirty="0"/>
           </a:p>
@@ -2523,7 +2523,7 @@
           <a:p>
             <a:fld id="{AFF16868-8199-4C2C-A5B1-63AEE139F88E}" type="datetimeFigureOut">
               <a:rPr lang="en-US" dirty="0"/>
-              <a:t>1/29/2021</a:t>
+              <a:t>1/31/2021</a:t>
             </a:fld>
             <a:endParaRPr lang="en-US" dirty="0"/>
           </a:p>
@@ -3653,7 +3653,7 @@
           <a:p>
             <a:fld id="{AAD9FF7F-6988-44CC-821B-644E70CD2F73}" type="datetimeFigureOut">
               <a:rPr lang="en-US" dirty="0"/>
-              <a:t>1/29/2021</a:t>
+              <a:t>1/31/2021</a:t>
             </a:fld>
             <a:endParaRPr lang="en-US" dirty="0"/>
           </a:p>
@@ -4682,7 +4682,7 @@
           <a:p>
             <a:fld id="{5C12C299-16B2-4475-990D-751901EACC14}" type="datetimeFigureOut">
               <a:rPr lang="en-US" dirty="0"/>
-              <a:t>1/29/2021</a:t>
+              <a:t>1/31/2021</a:t>
             </a:fld>
             <a:endParaRPr lang="en-US" dirty="0"/>
           </a:p>
@@ -5338,7 +5338,7 @@
           <a:p>
             <a:fld id="{9FE86839-B9D8-4651-8783-F325ECE74E65}" type="datetimeFigureOut">
               <a:rPr lang="en-US" dirty="0"/>
-              <a:t>1/29/2021</a:t>
+              <a:t>1/31/2021</a:t>
             </a:fld>
             <a:endParaRPr lang="en-US" dirty="0"/>
           </a:p>
@@ -6195,7 +6195,7 @@
           <a:p>
             <a:fld id="{FD484F64-32F6-45C5-931F-ADC1662401D0}" type="datetimeFigureOut">
               <a:rPr lang="en-US" dirty="0"/>
-              <a:t>1/29/2021</a:t>
+              <a:t>1/31/2021</a:t>
             </a:fld>
             <a:endParaRPr lang="en-US" dirty="0"/>
           </a:p>
@@ -6381,7 +6381,7 @@
           <a:p>
             <a:fld id="{53086D93-FCAC-47E0-A2EE-787E62CA814C}" type="datetimeFigureOut">
               <a:rPr lang="en-US" dirty="0"/>
-              <a:t>1/29/2021</a:t>
+              <a:t>1/31/2021</a:t>
             </a:fld>
             <a:endParaRPr lang="en-US" dirty="0"/>
           </a:p>
@@ -7349,7 +7349,7 @@
           <a:p>
             <a:fld id="{CDA879A6-0FD0-4734-A311-86BFCA472E6E}" type="datetimeFigureOut">
               <a:rPr lang="en-US" dirty="0"/>
-              <a:t>1/29/2021</a:t>
+              <a:t>1/31/2021</a:t>
             </a:fld>
             <a:endParaRPr lang="en-US" dirty="0"/>
           </a:p>
@@ -7556,7 +7556,7 @@
           <a:p>
             <a:fld id="{19C9CA7B-DFD4-44B5-8C60-D14B8CD1FB59}" type="datetimeFigureOut">
               <a:rPr lang="en-US" dirty="0"/>
-              <a:t>1/29/2021</a:t>
+              <a:t>1/31/2021</a:t>
             </a:fld>
             <a:endParaRPr lang="en-US" dirty="0"/>
           </a:p>
@@ -8586,7 +8586,7 @@
           <a:p>
             <a:fld id="{F34E6425-0181-43F2-84FC-787E803FD2F8}" type="datetimeFigureOut">
               <a:rPr lang="en-US" dirty="0"/>
-              <a:t>1/29/2021</a:t>
+              <a:t>1/31/2021</a:t>
             </a:fld>
             <a:endParaRPr lang="en-US" dirty="0"/>
           </a:p>
@@ -8854,7 +8854,7 @@
           <a:p>
             <a:fld id="{3BDB8791-F1B0-41E7-B7FD-A781E65C4266}" type="datetimeFigureOut">
               <a:rPr lang="en-US" dirty="0"/>
-              <a:t>1/29/2021</a:t>
+              <a:t>1/31/2021</a:t>
             </a:fld>
             <a:endParaRPr lang="en-US" dirty="0"/>
           </a:p>
@@ -9260,7 +9260,7 @@
           <a:p>
             <a:fld id="{5FDD63B2-E120-4ED8-B27B-C685F510A5FE}" type="datetimeFigureOut">
               <a:rPr lang="en-US" dirty="0"/>
-              <a:t>1/29/2021</a:t>
+              <a:t>1/31/2021</a:t>
             </a:fld>
             <a:endParaRPr lang="en-US" dirty="0"/>
           </a:p>
@@ -9383,7 +9383,7 @@
           <a:p>
             <a:fld id="{7AA18ACC-A947-437B-A130-35BD54FDF1E9}" type="datetimeFigureOut">
               <a:rPr lang="en-US" dirty="0"/>
-              <a:t>1/29/2021</a:t>
+              <a:t>1/31/2021</a:t>
             </a:fld>
             <a:endParaRPr lang="en-US" dirty="0"/>
           </a:p>
@@ -9474,7 +9474,7 @@
           <a:p>
             <a:fld id="{7C8D7E02-BCB8-4D50-A234-369438C08659}" type="datetimeFigureOut">
               <a:rPr lang="en-US" dirty="0"/>
-              <a:t>1/29/2021</a:t>
+              <a:t>1/31/2021</a:t>
             </a:fld>
             <a:endParaRPr lang="en-US" dirty="0"/>
           </a:p>
@@ -10551,7 +10551,7 @@
           <a:p>
             <a:fld id="{76E86A4C-8E40-4F87-A4F0-01A0687C5742}" type="datetimeFigureOut">
               <a:rPr lang="en-US" dirty="0"/>
-              <a:t>1/29/2021</a:t>
+              <a:t>1/31/2021</a:t>
             </a:fld>
             <a:endParaRPr lang="en-US" dirty="0"/>
           </a:p>
@@ -11655,7 +11655,7 @@
           <a:p>
             <a:fld id="{35E72C73-2D91-4E12-BA25-F0AA0C03599B}" type="datetimeFigureOut">
               <a:rPr lang="en-US" dirty="0"/>
-              <a:t>1/29/2021</a:t>
+              <a:t>1/31/2021</a:t>
             </a:fld>
             <a:endParaRPr lang="en-US" dirty="0"/>
           </a:p>
@@ -12648,7 +12648,7 @@
           <a:p>
             <a:fld id="{2BE451C3-0FF4-47C4-B829-773ADF60F88C}" type="datetimeFigureOut">
               <a:rPr lang="en-US" dirty="0"/>
-              <a:t>1/29/2021</a:t>
+              <a:t>1/31/2021</a:t>
             </a:fld>
             <a:endParaRPr lang="en-US" dirty="0"/>
           </a:p>
@@ -13404,20 +13404,26 @@
           <a:lstStyle/>
           <a:p>
             <a:r>
-              <a:rPr lang="it-IT" dirty="0" err="1"/>
-              <a:t>Because</a:t>
-            </a:r>
-            <a:r>
               <a:rPr lang="it-IT" dirty="0"/>
-              <a:t> </a:t>
-            </a:r>
-            <a:r>
-              <a:rPr lang="it-IT" dirty="0" err="1"/>
-              <a:t>it’s</a:t>
-            </a:r>
+              <a:t>Express.js framework to write API</a:t>
+            </a:r>
+          </a:p>
+          <a:p>
             <a:r>
               <a:rPr lang="it-IT" dirty="0"/>
-              <a:t> cool</a:t>
+              <a:t>Authentication using JWT</a:t>
+            </a:r>
+          </a:p>
+          <a:p>
+            <a:r>
+              <a:rPr lang="it-IT" dirty="0"/>
+              <a:t>Integration with MongoDB using Mongoose</a:t>
+            </a:r>
+          </a:p>
+          <a:p>
+            <a:r>
+              <a:rPr lang="it-IT" dirty="0"/>
+              <a:t>Easy to interact with Firebase Cloud Messaging</a:t>
             </a:r>
           </a:p>
         </p:txBody>
@@ -13756,6 +13762,42 @@
             <a:pPr marL="457200" lvl="1" indent="0">
               <a:buNone/>
             </a:pPr>
+            <a:r>
+              <a:rPr lang="it-IT" sz="2000" b="1" dirty="0"/>
+              <a:t>Provider:</a:t>
+            </a:r>
+          </a:p>
+          <a:p>
+            <a:pPr lvl="1"/>
+            <a:r>
+              <a:rPr lang="en-US" dirty="0"/>
+              <a:t>Google’s recommended approach</a:t>
+            </a:r>
+          </a:p>
+          <a:p>
+            <a:pPr lvl="1"/>
+            <a:r>
+              <a:rPr lang="en-US" dirty="0"/>
+              <a:t>Manage the tree of all the widgets easily</a:t>
+            </a:r>
+          </a:p>
+          <a:p>
+            <a:pPr lvl="1"/>
+            <a:r>
+              <a:rPr lang="en-US" dirty="0"/>
+              <a:t>Rebuild only where needed</a:t>
+            </a:r>
+          </a:p>
+          <a:p>
+            <a:pPr lvl="1"/>
+            <a:r>
+              <a:rPr lang="en-US" dirty="0"/>
+              <a:t>Get the model’s instance everywhere in the tree</a:t>
+            </a:r>
+            <a:endParaRPr lang="it-IT" dirty="0"/>
+          </a:p>
+          <a:p>
+            <a:pPr lvl="1"/>
             <a:endParaRPr lang="it-IT" dirty="0"/>
           </a:p>
         </p:txBody>

</xml_diff>